<commit_message>
update graphics material, rearrange/rename
</commit_message>
<xml_diff>
--- a/recursion/Recursion.pptx
+++ b/recursion/Recursion.pptx
@@ -71,7 +71,9 @@
           </a:prstGeom>
         </p:spPr>
         <p:txBody>
-          <a:bodyPr lIns="0" rIns="0" tIns="0" bIns="0" anchor="ctr"/>
+          <a:bodyPr lIns="0" rIns="0" tIns="0" bIns="0" anchor="ctr">
+            <a:noAutofit/>
+          </a:bodyPr>
           <a:p>
             <a:pPr algn="ctr"/>
             <a:r>
@@ -106,7 +108,9 @@
           </a:prstGeom>
         </p:spPr>
         <p:txBody>
-          <a:bodyPr lIns="0" rIns="0" tIns="0" bIns="0"/>
+          <a:bodyPr lIns="0" rIns="0" tIns="0" bIns="0">
+            <a:noAutofit/>
+          </a:bodyPr>
           <a:p>
             <a:r>
               <a:rPr b="0" lang="en-US" sz="2000" spc="-1" strike="noStrike">
@@ -140,7 +144,9 @@
           </a:prstGeom>
         </p:spPr>
         <p:txBody>
-          <a:bodyPr lIns="0" rIns="0" tIns="0" bIns="0"/>
+          <a:bodyPr lIns="0" rIns="0" tIns="0" bIns="0">
+            <a:noAutofit/>
+          </a:bodyPr>
           <a:p>
             <a:r>
               <a:rPr b="0" lang="en-US" sz="1400" spc="-1" strike="noStrike">
@@ -174,7 +180,9 @@
           </a:prstGeom>
         </p:spPr>
         <p:txBody>
-          <a:bodyPr lIns="0" rIns="0" tIns="0" bIns="0"/>
+          <a:bodyPr lIns="0" rIns="0" tIns="0" bIns="0">
+            <a:noAutofit/>
+          </a:bodyPr>
           <a:p>
             <a:pPr algn="r"/>
             <a:r>
@@ -209,7 +217,9 @@
           </a:prstGeom>
         </p:spPr>
         <p:txBody>
-          <a:bodyPr lIns="0" rIns="0" tIns="0" bIns="0" anchor="b"/>
+          <a:bodyPr lIns="0" rIns="0" tIns="0" bIns="0" anchor="b">
+            <a:noAutofit/>
+          </a:bodyPr>
           <a:p>
             <a:r>
               <a:rPr b="0" lang="en-US" sz="1400" spc="-1" strike="noStrike">
@@ -243,10 +253,12 @@
           </a:prstGeom>
         </p:spPr>
         <p:txBody>
-          <a:bodyPr lIns="0" rIns="0" tIns="0" bIns="0" anchor="b"/>
+          <a:bodyPr lIns="0" rIns="0" tIns="0" bIns="0" anchor="b">
+            <a:noAutofit/>
+          </a:bodyPr>
           <a:p>
             <a:pPr algn="r"/>
-            <a:fld id="{746C5C5D-91A7-459E-8052-6D35436C5D80}" type="slidenum">
+            <a:fld id="{CA2BC184-FA3F-4371-818C-A43F8BA7BEDB}" type="slidenum">
               <a:rPr b="0" lang="en-US" sz="1400" spc="-1" strike="noStrike">
                 <a:latin typeface="Times New Roman"/>
               </a:rPr>
@@ -294,7 +306,7 @@
         <p:spPr>
           <a:xfrm>
             <a:off x="2143080" y="695160"/>
-            <a:ext cx="2570760" cy="3427920"/>
+            <a:ext cx="2570040" cy="3427200"/>
           </a:xfrm>
           <a:prstGeom prst="rect">
             <a:avLst/>
@@ -310,7 +322,7 @@
         <p:spPr>
           <a:xfrm>
             <a:off x="685800" y="4343400"/>
-            <a:ext cx="5485320" cy="4113720"/>
+            <a:ext cx="5484600" cy="4113000"/>
           </a:xfrm>
           <a:custGeom>
             <a:avLst/>
@@ -385,7 +397,7 @@
         <p:spPr>
           <a:xfrm>
             <a:off x="2143080" y="695160"/>
-            <a:ext cx="2570760" cy="3427920"/>
+            <a:ext cx="2570040" cy="3427200"/>
           </a:xfrm>
           <a:prstGeom prst="rect">
             <a:avLst/>
@@ -401,7 +413,7 @@
         <p:spPr>
           <a:xfrm>
             <a:off x="685800" y="4343400"/>
-            <a:ext cx="5485320" cy="4113720"/>
+            <a:ext cx="5484600" cy="4113000"/>
           </a:xfrm>
           <a:custGeom>
             <a:avLst/>
@@ -476,7 +488,7 @@
         <p:spPr>
           <a:xfrm>
             <a:off x="2143080" y="695160"/>
-            <a:ext cx="2570760" cy="3427920"/>
+            <a:ext cx="2570040" cy="3427200"/>
           </a:xfrm>
           <a:prstGeom prst="rect">
             <a:avLst/>
@@ -492,7 +504,7 @@
         <p:spPr>
           <a:xfrm>
             <a:off x="685800" y="4343400"/>
-            <a:ext cx="5485320" cy="4113720"/>
+            <a:ext cx="5484600" cy="4113000"/>
           </a:xfrm>
           <a:custGeom>
             <a:avLst/>
@@ -567,7 +579,7 @@
         <p:spPr>
           <a:xfrm>
             <a:off x="2143080" y="695160"/>
-            <a:ext cx="2570760" cy="3427920"/>
+            <a:ext cx="2570040" cy="3427200"/>
           </a:xfrm>
           <a:prstGeom prst="rect">
             <a:avLst/>
@@ -583,7 +595,7 @@
         <p:spPr>
           <a:xfrm>
             <a:off x="685800" y="4343400"/>
-            <a:ext cx="5485320" cy="4113720"/>
+            <a:ext cx="5484600" cy="4113000"/>
           </a:xfrm>
           <a:custGeom>
             <a:avLst/>
@@ -658,7 +670,7 @@
         <p:spPr>
           <a:xfrm>
             <a:off x="2143080" y="695160"/>
-            <a:ext cx="2570760" cy="3427920"/>
+            <a:ext cx="2570040" cy="3427200"/>
           </a:xfrm>
           <a:prstGeom prst="rect">
             <a:avLst/>
@@ -674,7 +686,7 @@
         <p:spPr>
           <a:xfrm>
             <a:off x="685800" y="4343400"/>
-            <a:ext cx="5485320" cy="4113720"/>
+            <a:ext cx="5484600" cy="4113000"/>
           </a:xfrm>
           <a:custGeom>
             <a:avLst/>
@@ -749,7 +761,7 @@
         <p:spPr>
           <a:xfrm>
             <a:off x="1440" y="0"/>
-            <a:ext cx="720" cy="360"/>
+            <a:ext cx="0" cy="0"/>
           </a:xfrm>
           <a:prstGeom prst="rect">
             <a:avLst/>
@@ -765,7 +777,7 @@
         <p:spPr>
           <a:xfrm>
             <a:off x="685800" y="4343400"/>
-            <a:ext cx="5485320" cy="4113720"/>
+            <a:ext cx="5484600" cy="4113000"/>
           </a:xfrm>
           <a:custGeom>
             <a:avLst/>
@@ -840,7 +852,7 @@
         <p:spPr>
           <a:xfrm>
             <a:off x="1440" y="0"/>
-            <a:ext cx="720" cy="360"/>
+            <a:ext cx="0" cy="0"/>
           </a:xfrm>
           <a:prstGeom prst="rect">
             <a:avLst/>
@@ -856,7 +868,7 @@
         <p:spPr>
           <a:xfrm>
             <a:off x="685800" y="4343400"/>
-            <a:ext cx="5485320" cy="4113720"/>
+            <a:ext cx="5484600" cy="4113000"/>
           </a:xfrm>
           <a:custGeom>
             <a:avLst/>
@@ -931,7 +943,7 @@
         <p:spPr>
           <a:xfrm>
             <a:off x="1440" y="0"/>
-            <a:ext cx="720" cy="360"/>
+            <a:ext cx="0" cy="0"/>
           </a:xfrm>
           <a:prstGeom prst="rect">
             <a:avLst/>
@@ -947,7 +959,7 @@
         <p:spPr>
           <a:xfrm>
             <a:off x="685800" y="4343400"/>
-            <a:ext cx="5485320" cy="4113720"/>
+            <a:ext cx="5484600" cy="4113000"/>
           </a:xfrm>
           <a:custGeom>
             <a:avLst/>
@@ -1022,7 +1034,7 @@
         <p:spPr>
           <a:xfrm>
             <a:off x="1440" y="0"/>
-            <a:ext cx="720" cy="360"/>
+            <a:ext cx="0" cy="0"/>
           </a:xfrm>
           <a:prstGeom prst="rect">
             <a:avLst/>
@@ -1038,7 +1050,7 @@
         <p:spPr>
           <a:xfrm>
             <a:off x="685800" y="4343400"/>
-            <a:ext cx="5485320" cy="4113720"/>
+            <a:ext cx="5484600" cy="4113000"/>
           </a:xfrm>
           <a:custGeom>
             <a:avLst/>
@@ -1113,7 +1125,7 @@
         <p:spPr>
           <a:xfrm>
             <a:off x="1440" y="0"/>
-            <a:ext cx="720" cy="360"/>
+            <a:ext cx="0" cy="0"/>
           </a:xfrm>
           <a:prstGeom prst="rect">
             <a:avLst/>
@@ -1129,7 +1141,7 @@
         <p:spPr>
           <a:xfrm>
             <a:off x="685800" y="4343400"/>
-            <a:ext cx="5485320" cy="4113720"/>
+            <a:ext cx="5484600" cy="4113000"/>
           </a:xfrm>
           <a:custGeom>
             <a:avLst/>
@@ -1204,7 +1216,7 @@
         <p:spPr>
           <a:xfrm>
             <a:off x="1440" y="0"/>
-            <a:ext cx="720" cy="360"/>
+            <a:ext cx="0" cy="0"/>
           </a:xfrm>
           <a:prstGeom prst="rect">
             <a:avLst/>
@@ -1220,7 +1232,7 @@
         <p:spPr>
           <a:xfrm>
             <a:off x="685800" y="4343400"/>
-            <a:ext cx="5485320" cy="4113720"/>
+            <a:ext cx="5484600" cy="4113000"/>
           </a:xfrm>
           <a:custGeom>
             <a:avLst/>
@@ -1295,7 +1307,7 @@
         <p:spPr>
           <a:xfrm>
             <a:off x="2143080" y="695160"/>
-            <a:ext cx="2570760" cy="3427920"/>
+            <a:ext cx="2570040" cy="3427200"/>
           </a:xfrm>
           <a:prstGeom prst="rect">
             <a:avLst/>
@@ -1311,7 +1323,7 @@
         <p:spPr>
           <a:xfrm>
             <a:off x="685800" y="4343400"/>
-            <a:ext cx="5485320" cy="4113720"/>
+            <a:ext cx="5484600" cy="4113000"/>
           </a:xfrm>
           <a:custGeom>
             <a:avLst/>
@@ -1386,7 +1398,7 @@
         <p:spPr>
           <a:xfrm>
             <a:off x="2143080" y="695160"/>
-            <a:ext cx="2570760" cy="3427920"/>
+            <a:ext cx="2570040" cy="3427200"/>
           </a:xfrm>
           <a:prstGeom prst="rect">
             <a:avLst/>
@@ -1402,7 +1414,7 @@
         <p:spPr>
           <a:xfrm>
             <a:off x="685800" y="4343400"/>
-            <a:ext cx="5485320" cy="4113720"/>
+            <a:ext cx="5484600" cy="4113000"/>
           </a:xfrm>
           <a:custGeom>
             <a:avLst/>
@@ -1477,7 +1489,7 @@
         <p:spPr>
           <a:xfrm>
             <a:off x="2143080" y="695160"/>
-            <a:ext cx="2570760" cy="3427920"/>
+            <a:ext cx="2570040" cy="3427200"/>
           </a:xfrm>
           <a:prstGeom prst="rect">
             <a:avLst/>
@@ -1493,7 +1505,7 @@
         <p:spPr>
           <a:xfrm>
             <a:off x="685800" y="4343400"/>
-            <a:ext cx="5485320" cy="4113720"/>
+            <a:ext cx="5484600" cy="4113000"/>
           </a:xfrm>
           <a:custGeom>
             <a:avLst/>
@@ -1568,7 +1580,7 @@
         <p:spPr>
           <a:xfrm>
             <a:off x="2143080" y="695160"/>
-            <a:ext cx="2570760" cy="3427920"/>
+            <a:ext cx="2570040" cy="3427200"/>
           </a:xfrm>
           <a:prstGeom prst="rect">
             <a:avLst/>
@@ -1584,7 +1596,7 @@
         <p:spPr>
           <a:xfrm>
             <a:off x="685800" y="4343400"/>
-            <a:ext cx="5485320" cy="4113720"/>
+            <a:ext cx="5484600" cy="4113000"/>
           </a:xfrm>
           <a:custGeom>
             <a:avLst/>
@@ -1659,7 +1671,7 @@
         <p:spPr>
           <a:xfrm>
             <a:off x="2143080" y="695160"/>
-            <a:ext cx="2570760" cy="3427920"/>
+            <a:ext cx="2570040" cy="3427200"/>
           </a:xfrm>
           <a:prstGeom prst="rect">
             <a:avLst/>
@@ -1675,7 +1687,7 @@
         <p:spPr>
           <a:xfrm>
             <a:off x="685800" y="4343400"/>
-            <a:ext cx="5485320" cy="4113720"/>
+            <a:ext cx="5484600" cy="4113000"/>
           </a:xfrm>
           <a:custGeom>
             <a:avLst/>
@@ -1750,7 +1762,7 @@
         <p:spPr>
           <a:xfrm>
             <a:off x="2143080" y="695160"/>
-            <a:ext cx="2570760" cy="3427920"/>
+            <a:ext cx="2570040" cy="3427200"/>
           </a:xfrm>
           <a:prstGeom prst="rect">
             <a:avLst/>
@@ -1766,7 +1778,7 @@
         <p:spPr>
           <a:xfrm>
             <a:off x="685800" y="4343400"/>
-            <a:ext cx="5485320" cy="4113720"/>
+            <a:ext cx="5484600" cy="4113000"/>
           </a:xfrm>
           <a:custGeom>
             <a:avLst/>
@@ -1841,7 +1853,7 @@
         <p:spPr>
           <a:xfrm>
             <a:off x="1440" y="0"/>
-            <a:ext cx="720" cy="360"/>
+            <a:ext cx="0" cy="0"/>
           </a:xfrm>
           <a:prstGeom prst="rect">
             <a:avLst/>
@@ -1857,7 +1869,7 @@
         <p:spPr>
           <a:xfrm>
             <a:off x="685800" y="4343400"/>
-            <a:ext cx="5485320" cy="4113720"/>
+            <a:ext cx="5484600" cy="4113000"/>
           </a:xfrm>
           <a:custGeom>
             <a:avLst/>
@@ -1932,7 +1944,7 @@
         <p:spPr>
           <a:xfrm>
             <a:off x="1440" y="0"/>
-            <a:ext cx="720" cy="360"/>
+            <a:ext cx="0" cy="0"/>
           </a:xfrm>
           <a:prstGeom prst="rect">
             <a:avLst/>
@@ -1948,7 +1960,7 @@
         <p:spPr>
           <a:xfrm>
             <a:off x="685800" y="4343400"/>
-            <a:ext cx="5485320" cy="4113720"/>
+            <a:ext cx="5484600" cy="4113000"/>
           </a:xfrm>
           <a:custGeom>
             <a:avLst/>
@@ -2052,7 +2064,9 @@
           </a:prstGeom>
         </p:spPr>
         <p:txBody>
-          <a:bodyPr lIns="0" rIns="0" tIns="0" bIns="0" anchor="ctr"/>
+          <a:bodyPr lIns="0" rIns="0" tIns="0" bIns="0" anchor="ctr">
+            <a:noAutofit/>
+          </a:bodyPr>
           <a:p>
             <a:pPr algn="ctr"/>
             <a:endParaRPr b="0" lang="en-US" sz="4400" spc="-1" strike="noStrike">
@@ -2163,7 +2177,9 @@
           </a:prstGeom>
         </p:spPr>
         <p:txBody>
-          <a:bodyPr lIns="0" rIns="0" tIns="0" bIns="0" anchor="ctr"/>
+          <a:bodyPr lIns="0" rIns="0" tIns="0" bIns="0" anchor="ctr">
+            <a:noAutofit/>
+          </a:bodyPr>
           <a:p>
             <a:pPr algn="ctr"/>
             <a:endParaRPr b="0" lang="en-US" sz="4400" spc="-1" strike="noStrike">
@@ -2334,7 +2350,9 @@
           </a:prstGeom>
         </p:spPr>
         <p:txBody>
-          <a:bodyPr lIns="0" rIns="0" tIns="0" bIns="0" anchor="ctr"/>
+          <a:bodyPr lIns="0" rIns="0" tIns="0" bIns="0" anchor="ctr">
+            <a:noAutofit/>
+          </a:bodyPr>
           <a:p>
             <a:pPr algn="ctr"/>
             <a:endParaRPr b="0" lang="en-US" sz="4400" spc="-1" strike="noStrike">
@@ -2587,7 +2605,9 @@
           </a:prstGeom>
         </p:spPr>
         <p:txBody>
-          <a:bodyPr lIns="0" rIns="0" tIns="0" bIns="0" anchor="ctr"/>
+          <a:bodyPr lIns="0" rIns="0" tIns="0" bIns="0" anchor="ctr">
+            <a:noAutofit/>
+          </a:bodyPr>
           <a:p>
             <a:pPr algn="ctr"/>
             <a:endParaRPr b="0" lang="en-US" sz="4400" spc="-1" strike="noStrike">
@@ -2616,7 +2636,9 @@
           </a:prstGeom>
         </p:spPr>
         <p:txBody>
-          <a:bodyPr lIns="0" rIns="0" tIns="0" bIns="0" anchor="ctr"/>
+          <a:bodyPr lIns="0" rIns="0" tIns="0" bIns="0" anchor="ctr">
+            <a:noAutofit/>
+          </a:bodyPr>
           <a:p>
             <a:pPr algn="ctr"/>
             <a:endParaRPr b="0" lang="en-US" sz="3200" spc="-1" strike="noStrike">
@@ -2667,7 +2689,9 @@
           </a:prstGeom>
         </p:spPr>
         <p:txBody>
-          <a:bodyPr lIns="0" rIns="0" tIns="0" bIns="0" anchor="ctr"/>
+          <a:bodyPr lIns="0" rIns="0" tIns="0" bIns="0" anchor="ctr">
+            <a:noAutofit/>
+          </a:bodyPr>
           <a:p>
             <a:pPr algn="ctr"/>
             <a:endParaRPr b="0" lang="en-US" sz="4400" spc="-1" strike="noStrike">
@@ -2748,7 +2772,9 @@
           </a:prstGeom>
         </p:spPr>
         <p:txBody>
-          <a:bodyPr lIns="0" rIns="0" tIns="0" bIns="0" anchor="ctr"/>
+          <a:bodyPr lIns="0" rIns="0" tIns="0" bIns="0" anchor="ctr">
+            <a:noAutofit/>
+          </a:bodyPr>
           <a:p>
             <a:pPr algn="ctr"/>
             <a:endParaRPr b="0" lang="en-US" sz="4400" spc="-1" strike="noStrike">
@@ -2859,7 +2885,9 @@
           </a:prstGeom>
         </p:spPr>
         <p:txBody>
-          <a:bodyPr lIns="0" rIns="0" tIns="0" bIns="0" anchor="ctr"/>
+          <a:bodyPr lIns="0" rIns="0" tIns="0" bIns="0" anchor="ctr">
+            <a:noAutofit/>
+          </a:bodyPr>
           <a:p>
             <a:pPr algn="ctr"/>
             <a:endParaRPr b="0" lang="en-US" sz="4400" spc="-1" strike="noStrike">
@@ -2910,7 +2938,9 @@
           </a:prstGeom>
         </p:spPr>
         <p:txBody>
-          <a:bodyPr lIns="0" rIns="0" tIns="0" bIns="0" anchor="ctr"/>
+          <a:bodyPr lIns="0" rIns="0" tIns="0" bIns="0" anchor="ctr">
+            <a:noAutofit/>
+          </a:bodyPr>
           <a:p>
             <a:pPr algn="ctr"/>
             <a:endParaRPr b="0" lang="en-US" sz="3200" spc="-1" strike="noStrike">
@@ -2961,7 +2991,9 @@
           </a:prstGeom>
         </p:spPr>
         <p:txBody>
-          <a:bodyPr lIns="0" rIns="0" tIns="0" bIns="0" anchor="ctr"/>
+          <a:bodyPr lIns="0" rIns="0" tIns="0" bIns="0" anchor="ctr">
+            <a:noAutofit/>
+          </a:bodyPr>
           <a:p>
             <a:pPr algn="ctr"/>
             <a:endParaRPr b="0" lang="en-US" sz="4400" spc="-1" strike="noStrike">
@@ -3102,7 +3134,9 @@
           </a:prstGeom>
         </p:spPr>
         <p:txBody>
-          <a:bodyPr lIns="0" rIns="0" tIns="0" bIns="0" anchor="ctr"/>
+          <a:bodyPr lIns="0" rIns="0" tIns="0" bIns="0" anchor="ctr">
+            <a:noAutofit/>
+          </a:bodyPr>
           <a:p>
             <a:pPr algn="ctr"/>
             <a:endParaRPr b="0" lang="en-US" sz="4400" spc="-1" strike="noStrike">
@@ -3131,7 +3165,9 @@
           </a:prstGeom>
         </p:spPr>
         <p:txBody>
-          <a:bodyPr lIns="0" rIns="0" tIns="0" bIns="0" anchor="ctr"/>
+          <a:bodyPr lIns="0" rIns="0" tIns="0" bIns="0" anchor="ctr">
+            <a:noAutofit/>
+          </a:bodyPr>
           <a:p>
             <a:pPr algn="ctr"/>
             <a:endParaRPr b="0" lang="en-US" sz="3200" spc="-1" strike="noStrike">
@@ -3182,7 +3218,9 @@
           </a:prstGeom>
         </p:spPr>
         <p:txBody>
-          <a:bodyPr lIns="0" rIns="0" tIns="0" bIns="0" anchor="ctr"/>
+          <a:bodyPr lIns="0" rIns="0" tIns="0" bIns="0" anchor="ctr">
+            <a:noAutofit/>
+          </a:bodyPr>
           <a:p>
             <a:pPr algn="ctr"/>
             <a:endParaRPr b="0" lang="en-US" sz="4400" spc="-1" strike="noStrike">
@@ -3323,7 +3361,9 @@
           </a:prstGeom>
         </p:spPr>
         <p:txBody>
-          <a:bodyPr lIns="0" rIns="0" tIns="0" bIns="0" anchor="ctr"/>
+          <a:bodyPr lIns="0" rIns="0" tIns="0" bIns="0" anchor="ctr">
+            <a:noAutofit/>
+          </a:bodyPr>
           <a:p>
             <a:pPr algn="ctr"/>
             <a:endParaRPr b="0" lang="en-US" sz="4400" spc="-1" strike="noStrike">
@@ -3464,7 +3504,9 @@
           </a:prstGeom>
         </p:spPr>
         <p:txBody>
-          <a:bodyPr lIns="0" rIns="0" tIns="0" bIns="0" anchor="ctr"/>
+          <a:bodyPr lIns="0" rIns="0" tIns="0" bIns="0" anchor="ctr">
+            <a:noAutofit/>
+          </a:bodyPr>
           <a:p>
             <a:pPr algn="ctr"/>
             <a:endParaRPr b="0" lang="en-US" sz="4400" spc="-1" strike="noStrike">
@@ -3575,7 +3617,9 @@
           </a:prstGeom>
         </p:spPr>
         <p:txBody>
-          <a:bodyPr lIns="0" rIns="0" tIns="0" bIns="0" anchor="ctr"/>
+          <a:bodyPr lIns="0" rIns="0" tIns="0" bIns="0" anchor="ctr">
+            <a:noAutofit/>
+          </a:bodyPr>
           <a:p>
             <a:pPr algn="ctr"/>
             <a:endParaRPr b="0" lang="en-US" sz="4400" spc="-1" strike="noStrike">
@@ -3746,7 +3790,9 @@
           </a:prstGeom>
         </p:spPr>
         <p:txBody>
-          <a:bodyPr lIns="0" rIns="0" tIns="0" bIns="0" anchor="ctr"/>
+          <a:bodyPr lIns="0" rIns="0" tIns="0" bIns="0" anchor="ctr">
+            <a:noAutofit/>
+          </a:bodyPr>
           <a:p>
             <a:pPr algn="ctr"/>
             <a:endParaRPr b="0" lang="en-US" sz="4400" spc="-1" strike="noStrike">
@@ -3977,7 +4023,9 @@
           </a:prstGeom>
         </p:spPr>
         <p:txBody>
-          <a:bodyPr lIns="0" rIns="0" tIns="0" bIns="0" anchor="ctr"/>
+          <a:bodyPr lIns="0" rIns="0" tIns="0" bIns="0" anchor="ctr">
+            <a:noAutofit/>
+          </a:bodyPr>
           <a:p>
             <a:pPr algn="ctr"/>
             <a:endParaRPr b="0" lang="en-US" sz="4400" spc="-1" strike="noStrike">
@@ -4058,7 +4106,9 @@
           </a:prstGeom>
         </p:spPr>
         <p:txBody>
-          <a:bodyPr lIns="0" rIns="0" tIns="0" bIns="0" anchor="ctr"/>
+          <a:bodyPr lIns="0" rIns="0" tIns="0" bIns="0" anchor="ctr">
+            <a:noAutofit/>
+          </a:bodyPr>
           <a:p>
             <a:pPr algn="ctr"/>
             <a:endParaRPr b="0" lang="en-US" sz="4400" spc="-1" strike="noStrike">
@@ -4169,7 +4219,9 @@
           </a:prstGeom>
         </p:spPr>
         <p:txBody>
-          <a:bodyPr lIns="0" rIns="0" tIns="0" bIns="0" anchor="ctr"/>
+          <a:bodyPr lIns="0" rIns="0" tIns="0" bIns="0" anchor="ctr">
+            <a:noAutofit/>
+          </a:bodyPr>
           <a:p>
             <a:pPr algn="ctr"/>
             <a:endParaRPr b="0" lang="en-US" sz="4400" spc="-1" strike="noStrike">
@@ -4220,7 +4272,9 @@
           </a:prstGeom>
         </p:spPr>
         <p:txBody>
-          <a:bodyPr lIns="0" rIns="0" tIns="0" bIns="0" anchor="ctr"/>
+          <a:bodyPr lIns="0" rIns="0" tIns="0" bIns="0" anchor="ctr">
+            <a:noAutofit/>
+          </a:bodyPr>
           <a:p>
             <a:pPr algn="ctr"/>
             <a:endParaRPr b="0" lang="en-US" sz="3200" spc="-1" strike="noStrike">
@@ -4271,7 +4325,9 @@
           </a:prstGeom>
         </p:spPr>
         <p:txBody>
-          <a:bodyPr lIns="0" rIns="0" tIns="0" bIns="0" anchor="ctr"/>
+          <a:bodyPr lIns="0" rIns="0" tIns="0" bIns="0" anchor="ctr">
+            <a:noAutofit/>
+          </a:bodyPr>
           <a:p>
             <a:pPr algn="ctr"/>
             <a:endParaRPr b="0" lang="en-US" sz="4400" spc="-1" strike="noStrike">
@@ -4412,7 +4468,9 @@
           </a:prstGeom>
         </p:spPr>
         <p:txBody>
-          <a:bodyPr lIns="0" rIns="0" tIns="0" bIns="0" anchor="ctr"/>
+          <a:bodyPr lIns="0" rIns="0" tIns="0" bIns="0" anchor="ctr">
+            <a:noAutofit/>
+          </a:bodyPr>
           <a:p>
             <a:pPr algn="ctr"/>
             <a:endParaRPr b="0" lang="en-US" sz="4400" spc="-1" strike="noStrike">
@@ -4553,7 +4611,9 @@
           </a:prstGeom>
         </p:spPr>
         <p:txBody>
-          <a:bodyPr lIns="0" rIns="0" tIns="0" bIns="0" anchor="ctr"/>
+          <a:bodyPr lIns="0" rIns="0" tIns="0" bIns="0" anchor="ctr">
+            <a:noAutofit/>
+          </a:bodyPr>
           <a:p>
             <a:pPr algn="ctr"/>
             <a:endParaRPr b="0" lang="en-US" sz="4400" spc="-1" strike="noStrike">
@@ -4690,9 +4750,9 @@
         <p:grpSpPr>
           <a:xfrm>
             <a:off x="0" y="2438280"/>
-            <a:ext cx="8998560" cy="1042200"/>
+            <a:ext cx="8997840" cy="1041480"/>
             <a:chOff x="0" y="2438280"/>
-            <a:chExt cx="8998560" cy="1042200"/>
+            <a:chExt cx="8997840" cy="1041480"/>
           </a:xfrm>
         </p:grpSpPr>
         <p:grpSp>
@@ -4704,9 +4764,9 @@
           <p:grpSpPr>
             <a:xfrm>
               <a:off x="290520" y="2546280"/>
-              <a:ext cx="700560" cy="464040"/>
+              <a:ext cx="699840" cy="463320"/>
               <a:chOff x="290520" y="2546280"/>
-              <a:chExt cx="700560" cy="464040"/>
+              <a:chExt cx="699840" cy="463320"/>
             </a:xfrm>
           </p:grpSpPr>
           <p:sp>
@@ -4718,7 +4778,7 @@
             <p:spPr>
               <a:xfrm>
                 <a:off x="290520" y="2546280"/>
-                <a:ext cx="427680" cy="464040"/>
+                <a:ext cx="426960" cy="463320"/>
               </a:xfrm>
               <a:prstGeom prst="rect">
                 <a:avLst/>
@@ -4746,7 +4806,7 @@
             <p:spPr>
               <a:xfrm>
                 <a:off x="673200" y="2546280"/>
-                <a:ext cx="317880" cy="464040"/>
+                <a:ext cx="317160" cy="463320"/>
               </a:xfrm>
               <a:prstGeom prst="rect">
                 <a:avLst/>
@@ -4783,9 +4843,9 @@
           <p:grpSpPr>
             <a:xfrm>
               <a:off x="414360" y="2968560"/>
-              <a:ext cx="727200" cy="464040"/>
+              <a:ext cx="726480" cy="463320"/>
               <a:chOff x="414360" y="2968560"/>
-              <a:chExt cx="727200" cy="464040"/>
+              <a:chExt cx="726480" cy="463320"/>
             </a:xfrm>
           </p:grpSpPr>
           <p:sp>
@@ -4797,7 +4857,7 @@
             <p:spPr>
               <a:xfrm>
                 <a:off x="414360" y="2968560"/>
-                <a:ext cx="420480" cy="464040"/>
+                <a:ext cx="419760" cy="463320"/>
               </a:xfrm>
               <a:prstGeom prst="rect">
                 <a:avLst/>
@@ -4825,7 +4885,7 @@
             <p:spPr>
               <a:xfrm>
                 <a:off x="783360" y="2968560"/>
-                <a:ext cx="358200" cy="464040"/>
+                <a:ext cx="357480" cy="463320"/>
               </a:xfrm>
               <a:prstGeom prst="rect">
                 <a:avLst/>
@@ -4862,7 +4922,7 @@
           <p:spPr>
             <a:xfrm>
               <a:off x="0" y="2895480"/>
-              <a:ext cx="549720" cy="411840"/>
+              <a:ext cx="549000" cy="411120"/>
             </a:xfrm>
             <a:prstGeom prst="rect">
               <a:avLst/>
@@ -4898,7 +4958,7 @@
           <p:spPr>
             <a:xfrm>
               <a:off x="635040" y="2438280"/>
-              <a:ext cx="21240" cy="1042200"/>
+              <a:ext cx="20520" cy="1041480"/>
             </a:xfrm>
             <a:prstGeom prst="rect">
               <a:avLst/>
@@ -4925,8 +4985,8 @@
           </p:nvSpPr>
           <p:spPr>
             <a:xfrm flipV="1">
-              <a:off x="316080" y="3078720"/>
-              <a:ext cx="8682480" cy="44640"/>
+              <a:off x="316080" y="3077280"/>
+              <a:ext cx="8681760" cy="43920"/>
             </a:xfrm>
             <a:prstGeom prst="rect">
               <a:avLst/>
@@ -4974,26 +5034,16 @@
           </a:prstGeom>
         </p:spPr>
         <p:txBody>
-          <a:bodyPr lIns="0" rIns="0" tIns="0" bIns="0" anchor="ctr"/>
+          <a:bodyPr lIns="0" rIns="0" tIns="0" bIns="0" anchor="ctr">
+            <a:noAutofit/>
+          </a:bodyPr>
           <a:p>
             <a:pPr algn="ctr"/>
             <a:r>
               <a:rPr b="0" lang="en-US" sz="4400" spc="-1" strike="noStrike">
                 <a:latin typeface="Arial"/>
               </a:rPr>
-              <a:t>Click to edit </a:t>
-            </a:r>
-            <a:r>
-              <a:rPr b="0" lang="en-US" sz="4400" spc="-1" strike="noStrike">
-                <a:latin typeface="Arial"/>
-              </a:rPr>
-              <a:t>the title text </a:t>
-            </a:r>
-            <a:r>
-              <a:rPr b="0" lang="en-US" sz="4400" spc="-1" strike="noStrike">
-                <a:latin typeface="Arial"/>
-              </a:rPr>
-              <a:t>format</a:t>
+              <a:t>Click to edit the title text format</a:t>
             </a:r>
             <a:endParaRPr b="0" lang="en-US" sz="4400" spc="-1" strike="noStrike">
               <a:latin typeface="Arial"/>
@@ -5233,9 +5283,9 @@
         <p:grpSpPr>
           <a:xfrm>
             <a:off x="189000" y="368280"/>
-            <a:ext cx="8215560" cy="1041840"/>
+            <a:ext cx="8214840" cy="1041120"/>
             <a:chOff x="189000" y="368280"/>
-            <a:chExt cx="8215560" cy="1041840"/>
+            <a:chExt cx="8214840" cy="1041120"/>
           </a:xfrm>
         </p:grpSpPr>
         <p:sp>
@@ -5247,7 +5297,7 @@
           <p:spPr>
             <a:xfrm>
               <a:off x="507960" y="368280"/>
-              <a:ext cx="21240" cy="1041840"/>
+              <a:ext cx="20520" cy="1041120"/>
             </a:xfrm>
             <a:prstGeom prst="rect">
               <a:avLst/>
@@ -5275,7 +5325,7 @@
           <p:spPr>
             <a:xfrm>
               <a:off x="189000" y="1158840"/>
-              <a:ext cx="8215560" cy="21240"/>
+              <a:ext cx="8214840" cy="20520"/>
             </a:xfrm>
             <a:prstGeom prst="rect">
               <a:avLst/>
@@ -5323,7 +5373,9 @@
           </a:prstGeom>
         </p:spPr>
         <p:txBody>
-          <a:bodyPr lIns="0" rIns="0" tIns="0" bIns="0" anchor="ctr"/>
+          <a:bodyPr lIns="0" rIns="0" tIns="0" bIns="0" anchor="ctr">
+            <a:noAutofit/>
+          </a:bodyPr>
           <a:p>
             <a:pPr algn="ctr"/>
             <a:r>
@@ -5570,7 +5622,7 @@
         <p:spPr>
           <a:xfrm>
             <a:off x="990720" y="1676160"/>
-            <a:ext cx="7445880" cy="1460880"/>
+            <a:ext cx="7445160" cy="1460160"/>
           </a:xfrm>
           <a:prstGeom prst="rect">
             <a:avLst/>
@@ -5587,7 +5639,9 @@
           <a:fontRef idx="minor"/>
         </p:style>
         <p:txBody>
-          <a:bodyPr lIns="90000" rIns="90000" tIns="46800" bIns="46800" anchor="b"/>
+          <a:bodyPr lIns="90000" rIns="90000" tIns="46800" bIns="46800" anchor="b">
+            <a:noAutofit/>
+          </a:bodyPr>
           <a:p>
             <a:pPr algn="ctr">
               <a:lnSpc>
@@ -5619,7 +5673,7 @@
         <p:spPr>
           <a:xfrm>
             <a:off x="1371600" y="3886200"/>
-            <a:ext cx="6399720" cy="1751400"/>
+            <a:ext cx="6399000" cy="1750680"/>
           </a:xfrm>
           <a:prstGeom prst="rect">
             <a:avLst/>
@@ -5636,7 +5690,9 @@
           <a:fontRef idx="minor"/>
         </p:style>
         <p:txBody>
-          <a:bodyPr lIns="90000" rIns="90000" tIns="46800" bIns="46800"/>
+          <a:bodyPr lIns="90000" rIns="90000" tIns="46800" bIns="46800">
+            <a:noAutofit/>
+          </a:bodyPr>
           <a:p>
             <a:pPr algn="ctr">
               <a:lnSpc>
@@ -5664,33 +5720,14 @@
       </p:sp>
     </p:spTree>
   </p:cSld>
-  <p:timing>
-    <p:tnLst>
-      <p:par>
-        <p:cTn id="1" dur="indefinite" restart="never" nodeType="tmRoot">
-          <p:childTnLst>
-            <p:seq>
-              <p:cTn id="2" dur="indefinite" nodeType="mainSeq"/>
-              <p:prevCondLst>
-                <p:cond delay="0" evt="onPrev">
-                  <p:tgtEl>
-                    <p:sldTgt/>
-                  </p:tgtEl>
-                </p:cond>
-              </p:prevCondLst>
-              <p:nextCondLst>
-                <p:cond delay="0" evt="onNext">
-                  <p:tgtEl>
-                    <p:sldTgt/>
-                  </p:tgtEl>
-                </p:cond>
-              </p:nextCondLst>
-            </p:seq>
-          </p:childTnLst>
-        </p:cTn>
-      </p:par>
-    </p:tnLst>
-  </p:timing>
+  <mc:AlternateContent>
+    <mc:Choice Requires="p14">
+      <p:transition spd="slow" p14:dur="2000"/>
+    </mc:Choice>
+    <mc:Fallback>
+      <p:transition spd="slow"/>
+    </mc:Fallback>
+  </mc:AlternateContent>
 </p:sld>
 </file>
 
@@ -5727,7 +5764,7 @@
         <p:spPr>
           <a:xfrm>
             <a:off x="611280" y="259920"/>
-            <a:ext cx="7920360" cy="864000"/>
+            <a:ext cx="7919640" cy="863280"/>
           </a:xfrm>
           <a:prstGeom prst="rect">
             <a:avLst/>
@@ -5744,7 +5781,9 @@
           <a:fontRef idx="minor"/>
         </p:style>
         <p:txBody>
-          <a:bodyPr lIns="90000" rIns="90000" tIns="46800" bIns="46800" anchor="b"/>
+          <a:bodyPr lIns="90000" rIns="90000" tIns="46800" bIns="46800" anchor="b">
+            <a:noAutofit/>
+          </a:bodyPr>
           <a:p>
             <a:pPr algn="ctr">
               <a:lnSpc>
@@ -5776,7 +5815,7 @@
         <p:spPr>
           <a:xfrm>
             <a:off x="674280" y="1400040"/>
-            <a:ext cx="7920720" cy="4817160"/>
+            <a:ext cx="7920000" cy="4816440"/>
           </a:xfrm>
           <a:prstGeom prst="rect">
             <a:avLst/>
@@ -5797,7 +5836,7 @@
             <a:normAutofit/>
           </a:bodyPr>
           <a:p>
-            <a:pPr marL="333360" indent="-332280">
+            <a:pPr marL="333360" indent="-331560">
               <a:lnSpc>
                 <a:spcPct val="100000"/>
               </a:lnSpc>
@@ -5845,7 +5884,7 @@
             </a:endParaRPr>
           </a:p>
           <a:p>
-            <a:pPr lvl="1" marL="733320" indent="-275040">
+            <a:pPr lvl="1" marL="733320" indent="-274320">
               <a:lnSpc>
                 <a:spcPct val="100000"/>
               </a:lnSpc>
@@ -5874,7 +5913,7 @@
             </a:endParaRPr>
           </a:p>
           <a:p>
-            <a:pPr lvl="1" marL="733320" indent="-275040">
+            <a:pPr lvl="1" marL="733320" indent="-274320">
               <a:lnSpc>
                 <a:spcPct val="100000"/>
               </a:lnSpc>
@@ -5903,7 +5942,7 @@
             </a:endParaRPr>
           </a:p>
           <a:p>
-            <a:pPr marL="333360" indent="-332280">
+            <a:pPr marL="333360" indent="-331560">
               <a:lnSpc>
                 <a:spcPct val="100000"/>
               </a:lnSpc>
@@ -5951,7 +5990,7 @@
             </a:endParaRPr>
           </a:p>
           <a:p>
-            <a:pPr marL="333360" indent="-332280">
+            <a:pPr marL="333360" indent="-331560">
               <a:lnSpc>
                 <a:spcPct val="100000"/>
               </a:lnSpc>
@@ -6019,7 +6058,7 @@
             </a:endParaRPr>
           </a:p>
           <a:p>
-            <a:pPr marL="333360" indent="-332280">
+            <a:pPr marL="333360" indent="-331560">
               <a:lnSpc>
                 <a:spcPct val="100000"/>
               </a:lnSpc>
@@ -6060,13 +6099,16 @@
             </a:endParaRPr>
           </a:p>
           <a:p>
-            <a:pPr marL="212400" indent="-211320">
+            <a:pPr marL="212400" indent="-210600">
               <a:lnSpc>
                 <a:spcPct val="100000"/>
               </a:lnSpc>
               <a:spcBef>
                 <a:spcPts val="1423"/>
               </a:spcBef>
+              <a:tabLst>
+                <a:tab algn="l" pos="0"/>
+              </a:tabLst>
             </a:pPr>
             <a:r>
               <a:rPr b="0" lang="en-US" sz="2400" spc="-1" strike="noStrike">
@@ -6086,33 +6128,14 @@
       </p:sp>
     </p:spTree>
   </p:cSld>
-  <p:timing>
-    <p:tnLst>
-      <p:par>
-        <p:cTn id="19" dur="indefinite" restart="never" nodeType="tmRoot">
-          <p:childTnLst>
-            <p:seq>
-              <p:cTn id="20" dur="indefinite" nodeType="mainSeq"/>
-              <p:prevCondLst>
-                <p:cond delay="0" evt="onPrev">
-                  <p:tgtEl>
-                    <p:sldTgt/>
-                  </p:tgtEl>
-                </p:cond>
-              </p:prevCondLst>
-              <p:nextCondLst>
-                <p:cond delay="0" evt="onNext">
-                  <p:tgtEl>
-                    <p:sldTgt/>
-                  </p:tgtEl>
-                </p:cond>
-              </p:nextCondLst>
-            </p:seq>
-          </p:childTnLst>
-        </p:cTn>
-      </p:par>
-    </p:tnLst>
-  </p:timing>
+  <mc:AlternateContent>
+    <mc:Choice Requires="p14">
+      <p:transition spd="slow" p14:dur="2000"/>
+    </mc:Choice>
+    <mc:Fallback>
+      <p:transition spd="slow"/>
+    </mc:Fallback>
+  </mc:AlternateContent>
 </p:sld>
 </file>
 
@@ -6149,7 +6172,7 @@
         <p:spPr>
           <a:xfrm>
             <a:off x="611280" y="259920"/>
-            <a:ext cx="7920360" cy="864000"/>
+            <a:ext cx="7919640" cy="863280"/>
           </a:xfrm>
           <a:prstGeom prst="rect">
             <a:avLst/>
@@ -6166,7 +6189,9 @@
           <a:fontRef idx="minor"/>
         </p:style>
         <p:txBody>
-          <a:bodyPr lIns="90000" rIns="90000" tIns="46800" bIns="46800" anchor="b"/>
+          <a:bodyPr lIns="90000" rIns="90000" tIns="46800" bIns="46800" anchor="b">
+            <a:noAutofit/>
+          </a:bodyPr>
           <a:p>
             <a:pPr algn="ctr">
               <a:lnSpc>
@@ -6198,7 +6223,7 @@
         <p:spPr>
           <a:xfrm>
             <a:off x="503280" y="1399680"/>
-            <a:ext cx="8090280" cy="5078880"/>
+            <a:ext cx="8089560" cy="5078160"/>
           </a:xfrm>
           <a:prstGeom prst="rect">
             <a:avLst/>
@@ -6242,7 +6267,7 @@
             </a:endParaRPr>
           </a:p>
           <a:p>
-            <a:pPr marL="333360" indent="-332280">
+            <a:pPr marL="333360" indent="-331560">
               <a:lnSpc>
                 <a:spcPct val="100000"/>
               </a:lnSpc>
@@ -6290,7 +6315,7 @@
             </a:endParaRPr>
           </a:p>
           <a:p>
-            <a:pPr lvl="1" marL="733320" indent="-275040">
+            <a:pPr lvl="1" marL="733320" indent="-274320">
               <a:lnSpc>
                 <a:spcPct val="100000"/>
               </a:lnSpc>
@@ -6349,7 +6374,7 @@
             </a:endParaRPr>
           </a:p>
           <a:p>
-            <a:pPr marL="333360" indent="-332280">
+            <a:pPr marL="333360" indent="-331560">
               <a:lnSpc>
                 <a:spcPct val="100000"/>
               </a:lnSpc>
@@ -6429,7 +6454,7 @@
             </a:endParaRPr>
           </a:p>
           <a:p>
-            <a:pPr marL="333360" indent="-332280">
+            <a:pPr marL="333360" indent="-331560">
               <a:lnSpc>
                 <a:spcPct val="100000"/>
               </a:lnSpc>
@@ -6513,33 +6538,14 @@
       </p:sp>
     </p:spTree>
   </p:cSld>
-  <p:timing>
-    <p:tnLst>
-      <p:par>
-        <p:cTn id="21" dur="indefinite" restart="never" nodeType="tmRoot">
-          <p:childTnLst>
-            <p:seq>
-              <p:cTn id="22" dur="indefinite" nodeType="mainSeq"/>
-              <p:prevCondLst>
-                <p:cond delay="0" evt="onPrev">
-                  <p:tgtEl>
-                    <p:sldTgt/>
-                  </p:tgtEl>
-                </p:cond>
-              </p:prevCondLst>
-              <p:nextCondLst>
-                <p:cond delay="0" evt="onNext">
-                  <p:tgtEl>
-                    <p:sldTgt/>
-                  </p:tgtEl>
-                </p:cond>
-              </p:nextCondLst>
-            </p:seq>
-          </p:childTnLst>
-        </p:cTn>
-      </p:par>
-    </p:tnLst>
-  </p:timing>
+  <mc:AlternateContent>
+    <mc:Choice Requires="p14">
+      <p:transition spd="slow" p14:dur="2000"/>
+    </mc:Choice>
+    <mc:Fallback>
+      <p:transition spd="slow"/>
+    </mc:Fallback>
+  </mc:AlternateContent>
 </p:sld>
 </file>
 
@@ -6576,7 +6582,7 @@
         <p:spPr>
           <a:xfrm>
             <a:off x="611280" y="259920"/>
-            <a:ext cx="7920360" cy="864000"/>
+            <a:ext cx="7919640" cy="863280"/>
           </a:xfrm>
           <a:prstGeom prst="rect">
             <a:avLst/>
@@ -6593,7 +6599,9 @@
           <a:fontRef idx="minor"/>
         </p:style>
         <p:txBody>
-          <a:bodyPr lIns="90000" rIns="90000" tIns="46800" bIns="46800" anchor="b"/>
+          <a:bodyPr lIns="90000" rIns="90000" tIns="46800" bIns="46800" anchor="b">
+            <a:noAutofit/>
+          </a:bodyPr>
           <a:p>
             <a:pPr algn="ctr">
               <a:lnSpc>
@@ -6625,7 +6633,7 @@
         <p:spPr>
           <a:xfrm>
             <a:off x="503280" y="1399680"/>
-            <a:ext cx="8090280" cy="5078880"/>
+            <a:ext cx="8089560" cy="5078160"/>
           </a:xfrm>
           <a:prstGeom prst="rect">
             <a:avLst/>
@@ -6861,7 +6869,73 @@
                 <a:latin typeface="Arial"/>
                 <a:ea typeface="DejaVu Sans"/>
               </a:rPr>
-              <a:t>Famous examples: Quicksort algorithm. Knight's tour.</a:t>
+              <a:t>Famous examples: </a:t>
+            </a:r>
+            <a:endParaRPr b="0" lang="en-US" sz="2400" spc="-1" strike="noStrike">
+              <a:latin typeface="Arial"/>
+            </a:endParaRPr>
+          </a:p>
+          <a:p>
+            <a:pPr>
+              <a:lnSpc>
+                <a:spcPct val="100000"/>
+              </a:lnSpc>
+              <a:spcBef>
+                <a:spcPts val="598"/>
+              </a:spcBef>
+            </a:pPr>
+            <a:r>
+              <a:rPr b="0" lang="en-US" sz="2400" spc="-1" strike="noStrike">
+                <a:solidFill>
+                  <a:srgbClr val="000000"/>
+                </a:solidFill>
+                <a:latin typeface="Arial"/>
+                <a:ea typeface="DejaVu Sans"/>
+              </a:rPr>
+              <a:t>	</a:t>
+            </a:r>
+            <a:r>
+              <a:rPr b="0" lang="en-US" sz="2400" spc="-1" strike="noStrike">
+                <a:solidFill>
+                  <a:srgbClr val="000000"/>
+                </a:solidFill>
+                <a:latin typeface="Arial"/>
+                <a:ea typeface="DejaVu Sans"/>
+              </a:rPr>
+              <a:t>Quicksort algorithm </a:t>
+            </a:r>
+            <a:endParaRPr b="0" lang="en-US" sz="2400" spc="-1" strike="noStrike">
+              <a:latin typeface="Arial"/>
+            </a:endParaRPr>
+          </a:p>
+          <a:p>
+            <a:pPr>
+              <a:lnSpc>
+                <a:spcPct val="100000"/>
+              </a:lnSpc>
+              <a:spcBef>
+                <a:spcPts val="598"/>
+              </a:spcBef>
+            </a:pPr>
+            <a:r>
+              <a:rPr b="0" lang="en-US" sz="2400" spc="-1" strike="noStrike">
+                <a:solidFill>
+                  <a:srgbClr val="000000"/>
+                </a:solidFill>
+                <a:latin typeface="Arial"/>
+                <a:ea typeface="DejaVu Sans"/>
+              </a:rPr>
+              <a:t>	</a:t>
+            </a:r>
+            <a:r>
+              <a:rPr b="0" lang="en-US" sz="2400" spc="-1" strike="noStrike">
+                <a:solidFill>
+                  <a:srgbClr val="000000"/>
+                </a:solidFill>
+                <a:latin typeface="Arial"/>
+                <a:ea typeface="DejaVu Sans"/>
+              </a:rPr>
+              <a:t>Knight's tour</a:t>
             </a:r>
             <a:endParaRPr b="0" lang="en-US" sz="2400" spc="-1" strike="noStrike">
               <a:latin typeface="Arial"/>
@@ -6897,33 +6971,14 @@
       </p:sp>
     </p:spTree>
   </p:cSld>
-  <p:timing>
-    <p:tnLst>
-      <p:par>
-        <p:cTn id="23" dur="indefinite" restart="never" nodeType="tmRoot">
-          <p:childTnLst>
-            <p:seq>
-              <p:cTn id="24" dur="indefinite" nodeType="mainSeq"/>
-              <p:prevCondLst>
-                <p:cond delay="0" evt="onPrev">
-                  <p:tgtEl>
-                    <p:sldTgt/>
-                  </p:tgtEl>
-                </p:cond>
-              </p:prevCondLst>
-              <p:nextCondLst>
-                <p:cond delay="0" evt="onNext">
-                  <p:tgtEl>
-                    <p:sldTgt/>
-                  </p:tgtEl>
-                </p:cond>
-              </p:nextCondLst>
-            </p:seq>
-          </p:childTnLst>
-        </p:cTn>
-      </p:par>
-    </p:tnLst>
-  </p:timing>
+  <mc:AlternateContent>
+    <mc:Choice Requires="p14">
+      <p:transition spd="slow" p14:dur="2000"/>
+    </mc:Choice>
+    <mc:Fallback>
+      <p:transition spd="slow"/>
+    </mc:Fallback>
+  </mc:AlternateContent>
 </p:sld>
 </file>
 
@@ -6960,7 +7015,7 @@
         <p:spPr>
           <a:xfrm>
             <a:off x="611280" y="259920"/>
-            <a:ext cx="7920360" cy="864000"/>
+            <a:ext cx="7919640" cy="863280"/>
           </a:xfrm>
           <a:prstGeom prst="rect">
             <a:avLst/>
@@ -6977,7 +7032,9 @@
           <a:fontRef idx="minor"/>
         </p:style>
         <p:txBody>
-          <a:bodyPr lIns="90000" rIns="90000" tIns="46800" bIns="46800" anchor="b"/>
+          <a:bodyPr lIns="90000" rIns="90000" tIns="46800" bIns="46800" anchor="b">
+            <a:noAutofit/>
+          </a:bodyPr>
           <a:p>
             <a:pPr algn="ctr">
               <a:lnSpc>
@@ -7009,7 +7066,7 @@
         <p:spPr>
           <a:xfrm>
             <a:off x="503280" y="1399680"/>
-            <a:ext cx="8090280" cy="5078880"/>
+            <a:ext cx="8089560" cy="5078160"/>
           </a:xfrm>
           <a:prstGeom prst="rect">
             <a:avLst/>
@@ -7082,7 +7139,27 @@
                 <a:latin typeface="Arial"/>
                 <a:ea typeface="DejaVu Sans"/>
               </a:rPr>
-              <a:t>My opinion:  No.</a:t>
+              <a:t>My opinion:  </a:t>
+            </a:r>
+            <a:r>
+              <a:rPr b="1" lang="en-US" sz="2400" spc="-1" strike="noStrike">
+                <a:solidFill>
+                  <a:srgbClr val="000080"/>
+                </a:solidFill>
+                <a:latin typeface="Arial"/>
+                <a:ea typeface="DejaVu Sans"/>
+              </a:rPr>
+              <a:t>No</a:t>
+            </a:r>
+            <a:r>
+              <a:rPr b="0" lang="en-US" sz="2400" spc="-1" strike="noStrike">
+                <a:solidFill>
+                  <a:srgbClr val="000000"/>
+                </a:solidFill>
+                <a:latin typeface="Arial"/>
+                <a:ea typeface="DejaVu Sans"/>
+              </a:rPr>
+              <a:t>.</a:t>
             </a:r>
             <a:endParaRPr b="0" lang="en-US" sz="2400" spc="-1" strike="noStrike">
               <a:latin typeface="Arial"/>
@@ -7118,7 +7195,27 @@
                 <a:latin typeface="Arial"/>
                 <a:ea typeface="DejaVu Sans"/>
               </a:rPr>
-              <a:t>1 + 2 + ... + n ==&gt; looks like iteration (a loop)</a:t>
+              <a:t>1 + 2 + ... + n ==&gt; looks like </a:t>
+            </a:r>
+            <a:r>
+              <a:rPr b="0" i="1" lang="en-US" sz="2400" spc="-1" strike="noStrike">
+                <a:solidFill>
+                  <a:srgbClr val="000080"/>
+                </a:solidFill>
+                <a:latin typeface="Arial"/>
+                <a:ea typeface="DejaVu Sans"/>
+              </a:rPr>
+              <a:t>iteration</a:t>
+            </a:r>
+            <a:r>
+              <a:rPr b="0" lang="en-US" sz="2400" spc="-1" strike="noStrike">
+                <a:solidFill>
+                  <a:srgbClr val="000000"/>
+                </a:solidFill>
+                <a:latin typeface="Arial"/>
+                <a:ea typeface="DejaVu Sans"/>
+              </a:rPr>
+              <a:t> (a loop)</a:t>
             </a:r>
             <a:endParaRPr b="0" lang="en-US" sz="2400" spc="-1" strike="noStrike">
               <a:latin typeface="Arial"/>
@@ -7154,33 +7251,14 @@
       </p:sp>
     </p:spTree>
   </p:cSld>
-  <p:timing>
-    <p:tnLst>
-      <p:par>
-        <p:cTn id="25" dur="indefinite" restart="never" nodeType="tmRoot">
-          <p:childTnLst>
-            <p:seq>
-              <p:cTn id="26" dur="indefinite" nodeType="mainSeq"/>
-              <p:prevCondLst>
-                <p:cond delay="0" evt="onPrev">
-                  <p:tgtEl>
-                    <p:sldTgt/>
-                  </p:tgtEl>
-                </p:cond>
-              </p:prevCondLst>
-              <p:nextCondLst>
-                <p:cond delay="0" evt="onNext">
-                  <p:tgtEl>
-                    <p:sldTgt/>
-                  </p:tgtEl>
-                </p:cond>
-              </p:nextCondLst>
-            </p:seq>
-          </p:childTnLst>
-        </p:cTn>
-      </p:par>
-    </p:tnLst>
-  </p:timing>
+  <mc:AlternateContent>
+    <mc:Choice Requires="p14">
+      <p:transition spd="slow" p14:dur="2000"/>
+    </mc:Choice>
+    <mc:Fallback>
+      <p:transition spd="slow"/>
+    </mc:Fallback>
+  </mc:AlternateContent>
 </p:sld>
 </file>
 
@@ -7217,7 +7295,7 @@
         <p:spPr>
           <a:xfrm>
             <a:off x="611280" y="259920"/>
-            <a:ext cx="7920360" cy="864000"/>
+            <a:ext cx="7919640" cy="863280"/>
           </a:xfrm>
           <a:prstGeom prst="rect">
             <a:avLst/>
@@ -7234,7 +7312,9 @@
           <a:fontRef idx="minor"/>
         </p:style>
         <p:txBody>
-          <a:bodyPr lIns="90000" rIns="90000" tIns="46800" bIns="46800" anchor="ctr"/>
+          <a:bodyPr lIns="90000" rIns="90000" tIns="46800" bIns="46800" anchor="ctr">
+            <a:noAutofit/>
+          </a:bodyPr>
           <a:p>
             <a:pPr algn="ctr">
               <a:lnSpc>
@@ -7266,7 +7346,7 @@
         <p:spPr>
           <a:xfrm>
             <a:off x="501120" y="1439640"/>
-            <a:ext cx="7920720" cy="519840"/>
+            <a:ext cx="7920000" cy="519120"/>
           </a:xfrm>
           <a:prstGeom prst="rect">
             <a:avLst/>
@@ -7287,13 +7367,16 @@
             <a:normAutofit/>
           </a:bodyPr>
           <a:p>
-            <a:pPr marL="341280" indent="-332280">
+            <a:pPr marL="341280" indent="-331560">
               <a:lnSpc>
                 <a:spcPct val="100000"/>
               </a:lnSpc>
               <a:spcBef>
                 <a:spcPts val="598"/>
               </a:spcBef>
+              <a:tabLst>
+                <a:tab algn="l" pos="0"/>
+              </a:tabLst>
             </a:pPr>
             <a:r>
               <a:rPr b="0" lang="en-US" sz="2400" spc="-1" strike="noStrike">
@@ -7320,7 +7403,7 @@
         <p:spPr>
           <a:xfrm>
             <a:off x="456480" y="2014920"/>
-            <a:ext cx="8138160" cy="2099160"/>
+            <a:ext cx="8137440" cy="2098440"/>
           </a:xfrm>
           <a:custGeom>
             <a:avLst/>
@@ -7365,7 +7448,9 @@
           <a:fontRef idx="minor"/>
         </p:style>
         <p:txBody>
-          <a:bodyPr lIns="90000" rIns="90000" tIns="46800" bIns="46800"/>
+          <a:bodyPr lIns="90000" rIns="90000" tIns="46800" bIns="46800">
+            <a:noAutofit/>
+          </a:bodyPr>
           <a:p>
             <a:pPr>
               <a:lnSpc>
@@ -7552,7 +7637,7 @@
         <p:spPr>
           <a:xfrm>
             <a:off x="399600" y="4480560"/>
-            <a:ext cx="7920720" cy="1828440"/>
+            <a:ext cx="7920000" cy="1827720"/>
           </a:xfrm>
           <a:prstGeom prst="rect">
             <a:avLst/>
@@ -7573,13 +7658,16 @@
             <a:normAutofit/>
           </a:bodyPr>
           <a:p>
-            <a:pPr marL="341280" indent="-332280">
+            <a:pPr marL="341280" indent="-331560">
               <a:lnSpc>
                 <a:spcPct val="100000"/>
               </a:lnSpc>
               <a:spcBef>
                 <a:spcPts val="598"/>
               </a:spcBef>
+              <a:tabLst>
+                <a:tab algn="l" pos="0"/>
+              </a:tabLst>
             </a:pPr>
             <a:r>
               <a:rPr b="0" lang="en-US" sz="2400" spc="-1" strike="noStrike">
@@ -7596,13 +7684,16 @@
             </a:endParaRPr>
           </a:p>
           <a:p>
-            <a:pPr marL="341280" indent="-332280">
+            <a:pPr marL="341280" indent="-331560">
               <a:lnSpc>
                 <a:spcPct val="100000"/>
               </a:lnSpc>
               <a:spcBef>
                 <a:spcPts val="598"/>
               </a:spcBef>
+              <a:tabLst>
+                <a:tab algn="l" pos="0"/>
+              </a:tabLst>
             </a:pPr>
             <a:r>
               <a:rPr b="0" lang="en-US" sz="2400" spc="-1" strike="noStrike">
@@ -7642,33 +7733,14 @@
       </p:sp>
     </p:spTree>
   </p:cSld>
-  <p:timing>
-    <p:tnLst>
-      <p:par>
-        <p:cTn id="27" dur="indefinite" restart="never" nodeType="tmRoot">
-          <p:childTnLst>
-            <p:seq>
-              <p:cTn id="28" dur="indefinite" nodeType="mainSeq"/>
-              <p:prevCondLst>
-                <p:cond delay="0" evt="onPrev">
-                  <p:tgtEl>
-                    <p:sldTgt/>
-                  </p:tgtEl>
-                </p:cond>
-              </p:prevCondLst>
-              <p:nextCondLst>
-                <p:cond delay="0" evt="onNext">
-                  <p:tgtEl>
-                    <p:sldTgt/>
-                  </p:tgtEl>
-                </p:cond>
-              </p:nextCondLst>
-            </p:seq>
-          </p:childTnLst>
-        </p:cTn>
-      </p:par>
-    </p:tnLst>
-  </p:timing>
+  <mc:AlternateContent>
+    <mc:Choice Requires="p14">
+      <p:transition spd="slow" p14:dur="2000"/>
+    </mc:Choice>
+    <mc:Fallback>
+      <p:transition spd="slow"/>
+    </mc:Fallback>
+  </mc:AlternateContent>
 </p:sld>
 </file>
 
@@ -7705,7 +7777,7 @@
         <p:spPr>
           <a:xfrm>
             <a:off x="611280" y="259920"/>
-            <a:ext cx="7920360" cy="864000"/>
+            <a:ext cx="7919640" cy="863280"/>
           </a:xfrm>
           <a:prstGeom prst="rect">
             <a:avLst/>
@@ -7722,7 +7794,9 @@
           <a:fontRef idx="minor"/>
         </p:style>
         <p:txBody>
-          <a:bodyPr lIns="90000" rIns="90000" tIns="46800" bIns="46800" anchor="ctr"/>
+          <a:bodyPr lIns="90000" rIns="90000" tIns="46800" bIns="46800" anchor="ctr">
+            <a:noAutofit/>
+          </a:bodyPr>
           <a:p>
             <a:pPr algn="ctr">
               <a:lnSpc>
@@ -7754,7 +7828,7 @@
         <p:spPr>
           <a:xfrm>
             <a:off x="501120" y="1367640"/>
-            <a:ext cx="7920720" cy="1740600"/>
+            <a:ext cx="7920000" cy="1739880"/>
           </a:xfrm>
           <a:prstGeom prst="rect">
             <a:avLst/>
@@ -7775,13 +7849,16 @@
             <a:normAutofit/>
           </a:bodyPr>
           <a:p>
-            <a:pPr marL="341280" indent="-332280">
+            <a:pPr marL="341280" indent="-331560">
               <a:lnSpc>
                 <a:spcPct val="100000"/>
               </a:lnSpc>
               <a:spcBef>
                 <a:spcPts val="598"/>
               </a:spcBef>
+              <a:tabLst>
+                <a:tab algn="l" pos="0"/>
+              </a:tabLst>
             </a:pPr>
             <a:r>
               <a:rPr b="0" lang="en-US" sz="2400" spc="-1" strike="noStrike">
@@ -7798,13 +7875,16 @@
             </a:endParaRPr>
           </a:p>
           <a:p>
-            <a:pPr marL="341280" indent="-332280">
+            <a:pPr marL="341280" indent="-331560">
               <a:lnSpc>
                 <a:spcPct val="100000"/>
               </a:lnSpc>
               <a:spcBef>
                 <a:spcPts val="598"/>
               </a:spcBef>
+              <a:tabLst>
+                <a:tab algn="l" pos="0"/>
+              </a:tabLst>
             </a:pPr>
             <a:r>
               <a:rPr b="0" lang="en-US" sz="2400" spc="-1" strike="noStrike">
@@ -7851,7 +7931,7 @@
         <p:spPr>
           <a:xfrm>
             <a:off x="368640" y="3089520"/>
-            <a:ext cx="8137800" cy="547920"/>
+            <a:ext cx="8137080" cy="547200"/>
           </a:xfrm>
           <a:custGeom>
             <a:avLst/>
@@ -7896,7 +7976,9 @@
           <a:fontRef idx="minor"/>
         </p:style>
         <p:txBody>
-          <a:bodyPr lIns="90000" rIns="90000" tIns="46800" bIns="46800"/>
+          <a:bodyPr lIns="90000" rIns="90000" tIns="46800" bIns="46800">
+            <a:noAutofit/>
+          </a:bodyPr>
           <a:p>
             <a:pPr>
               <a:lnSpc>
@@ -7951,7 +8033,7 @@
         <p:spPr>
           <a:xfrm>
             <a:off x="295200" y="3940200"/>
-            <a:ext cx="8138160" cy="2368440"/>
+            <a:ext cx="8137440" cy="2367720"/>
           </a:xfrm>
           <a:custGeom>
             <a:avLst/>
@@ -7996,7 +8078,9 @@
           <a:fontRef idx="minor"/>
         </p:style>
         <p:txBody>
-          <a:bodyPr lIns="90000" rIns="90000" tIns="46800" bIns="46800"/>
+          <a:bodyPr lIns="90000" rIns="90000" tIns="46800" bIns="46800">
+            <a:noAutofit/>
+          </a:bodyPr>
           <a:p>
             <a:pPr>
               <a:lnSpc>
@@ -8239,33 +8323,14 @@
       </p:sp>
     </p:spTree>
   </p:cSld>
-  <p:timing>
-    <p:tnLst>
-      <p:par>
-        <p:cTn id="29" dur="indefinite" restart="never" nodeType="tmRoot">
-          <p:childTnLst>
-            <p:seq>
-              <p:cTn id="30" dur="indefinite" nodeType="mainSeq"/>
-              <p:prevCondLst>
-                <p:cond delay="0" evt="onPrev">
-                  <p:tgtEl>
-                    <p:sldTgt/>
-                  </p:tgtEl>
-                </p:cond>
-              </p:prevCondLst>
-              <p:nextCondLst>
-                <p:cond delay="0" evt="onNext">
-                  <p:tgtEl>
-                    <p:sldTgt/>
-                  </p:tgtEl>
-                </p:cond>
-              </p:nextCondLst>
-            </p:seq>
-          </p:childTnLst>
-        </p:cTn>
-      </p:par>
-    </p:tnLst>
-  </p:timing>
+  <mc:AlternateContent>
+    <mc:Choice Requires="p14">
+      <p:transition spd="slow" p14:dur="2000"/>
+    </mc:Choice>
+    <mc:Fallback>
+      <p:transition spd="slow"/>
+    </mc:Fallback>
+  </mc:AlternateContent>
 </p:sld>
 </file>
 
@@ -8302,7 +8367,7 @@
         <p:spPr>
           <a:xfrm>
             <a:off x="611280" y="259920"/>
-            <a:ext cx="7920360" cy="864000"/>
+            <a:ext cx="7919640" cy="863280"/>
           </a:xfrm>
           <a:prstGeom prst="rect">
             <a:avLst/>
@@ -8319,7 +8384,9 @@
           <a:fontRef idx="minor"/>
         </p:style>
         <p:txBody>
-          <a:bodyPr lIns="90000" rIns="90000" tIns="46800" bIns="46800" anchor="ctr"/>
+          <a:bodyPr lIns="90000" rIns="90000" tIns="46800" bIns="46800" anchor="ctr">
+            <a:noAutofit/>
+          </a:bodyPr>
           <a:p>
             <a:pPr algn="ctr">
               <a:lnSpc>
@@ -8351,7 +8418,7 @@
         <p:spPr>
           <a:xfrm>
             <a:off x="674280" y="1399680"/>
-            <a:ext cx="7920720" cy="4463280"/>
+            <a:ext cx="7920000" cy="4462560"/>
           </a:xfrm>
           <a:prstGeom prst="rect">
             <a:avLst/>
@@ -8428,33 +8495,14 @@
       </p:sp>
     </p:spTree>
   </p:cSld>
-  <p:timing>
-    <p:tnLst>
-      <p:par>
-        <p:cTn id="31" dur="indefinite" restart="never" nodeType="tmRoot">
-          <p:childTnLst>
-            <p:seq>
-              <p:cTn id="32" dur="indefinite" nodeType="mainSeq"/>
-              <p:prevCondLst>
-                <p:cond delay="0" evt="onPrev">
-                  <p:tgtEl>
-                    <p:sldTgt/>
-                  </p:tgtEl>
-                </p:cond>
-              </p:prevCondLst>
-              <p:nextCondLst>
-                <p:cond delay="0" evt="onNext">
-                  <p:tgtEl>
-                    <p:sldTgt/>
-                  </p:tgtEl>
-                </p:cond>
-              </p:nextCondLst>
-            </p:seq>
-          </p:childTnLst>
-        </p:cTn>
-      </p:par>
-    </p:tnLst>
-  </p:timing>
+  <mc:AlternateContent>
+    <mc:Choice Requires="p14">
+      <p:transition spd="slow" p14:dur="2000"/>
+    </mc:Choice>
+    <mc:Fallback>
+      <p:transition spd="slow"/>
+    </mc:Fallback>
+  </mc:AlternateContent>
 </p:sld>
 </file>
 
@@ -8491,7 +8539,7 @@
         <p:spPr>
           <a:xfrm>
             <a:off x="611280" y="259920"/>
-            <a:ext cx="7920360" cy="864000"/>
+            <a:ext cx="7919640" cy="863280"/>
           </a:xfrm>
           <a:prstGeom prst="rect">
             <a:avLst/>
@@ -8508,7 +8556,9 @@
           <a:fontRef idx="minor"/>
         </p:style>
         <p:txBody>
-          <a:bodyPr lIns="90000" rIns="90000" tIns="46800" bIns="46800" anchor="ctr"/>
+          <a:bodyPr lIns="90000" rIns="90000" tIns="46800" bIns="46800" anchor="ctr">
+            <a:noAutofit/>
+          </a:bodyPr>
           <a:p>
             <a:pPr algn="ctr">
               <a:lnSpc>
@@ -8540,7 +8590,7 @@
         <p:spPr>
           <a:xfrm>
             <a:off x="674280" y="1399680"/>
-            <a:ext cx="7920720" cy="5007600"/>
+            <a:ext cx="7920000" cy="5006880"/>
           </a:xfrm>
           <a:prstGeom prst="rect">
             <a:avLst/>
@@ -8558,10 +8608,10 @@
         </p:style>
         <p:txBody>
           <a:bodyPr lIns="90000" rIns="90000" tIns="46800" bIns="46800">
-            <a:normAutofit/>
+            <a:normAutofit fontScale="94000"/>
           </a:bodyPr>
           <a:p>
-            <a:pPr marL="333360" indent="-332280">
+            <a:pPr marL="333360" indent="-331560">
               <a:lnSpc>
                 <a:spcPct val="100000"/>
               </a:lnSpc>
@@ -8641,20 +8691,23 @@
             </a:endParaRPr>
           </a:p>
           <a:p>
-            <a:pPr marL="341280" indent="-332280">
+            <a:pPr marL="341280" indent="-331560">
               <a:lnSpc>
                 <a:spcPct val="100000"/>
               </a:lnSpc>
               <a:spcBef>
                 <a:spcPts val="598"/>
               </a:spcBef>
+              <a:tabLst>
+                <a:tab algn="l" pos="0"/>
+              </a:tabLst>
             </a:pPr>
             <a:endParaRPr b="0" lang="en-US" sz="2400" spc="-1" strike="noStrike">
               <a:latin typeface="Arial"/>
             </a:endParaRPr>
           </a:p>
           <a:p>
-            <a:pPr marL="333360" indent="-332280">
+            <a:pPr marL="333360" indent="-331560">
               <a:lnSpc>
                 <a:spcPct val="100000"/>
               </a:lnSpc>
@@ -8667,6 +8720,9 @@
               <a:buSzPct val="60000"/>
               <a:buFont typeface="Wingdings" charset="2"/>
               <a:buChar char=""/>
+              <a:tabLst>
+                <a:tab algn="l" pos="0"/>
+              </a:tabLst>
             </a:pPr>
             <a:r>
               <a:rPr b="0" lang="en-US" sz="2400" spc="-1" strike="noStrike">
@@ -8683,7 +8739,7 @@
             </a:endParaRPr>
           </a:p>
           <a:p>
-            <a:pPr lvl="1" marL="733320" indent="-275040">
+            <a:pPr lvl="1" marL="733320" indent="-274320">
               <a:lnSpc>
                 <a:spcPct val="100000"/>
               </a:lnSpc>
@@ -8696,6 +8752,9 @@
               <a:buSzPct val="55000"/>
               <a:buFont typeface="Wingdings" charset="2"/>
               <a:buChar char=""/>
+              <a:tabLst>
+                <a:tab algn="l" pos="0"/>
+              </a:tabLst>
             </a:pPr>
             <a:r>
               <a:rPr b="0" lang="en-US" sz="2400" spc="-1" strike="noStrike">
@@ -8753,7 +8812,7 @@
             </a:endParaRPr>
           </a:p>
           <a:p>
-            <a:pPr lvl="1" marL="733320" indent="-275040">
+            <a:pPr lvl="1" marL="733320" indent="-274320">
               <a:lnSpc>
                 <a:spcPct val="100000"/>
               </a:lnSpc>
@@ -8766,6 +8825,9 @@
               <a:buSzPct val="55000"/>
               <a:buFont typeface="Wingdings" charset="2"/>
               <a:buChar char=""/>
+              <a:tabLst>
+                <a:tab algn="l" pos="0"/>
+              </a:tabLst>
             </a:pPr>
             <a:r>
               <a:rPr b="0" lang="en-US" sz="2400" spc="-1" strike="noStrike">
@@ -8782,7 +8844,7 @@
             </a:endParaRPr>
           </a:p>
           <a:p>
-            <a:pPr lvl="1" marL="733320" indent="-275040">
+            <a:pPr lvl="1" marL="733320" indent="-274320">
               <a:lnSpc>
                 <a:spcPct val="100000"/>
               </a:lnSpc>
@@ -8795,6 +8857,9 @@
               <a:buSzPct val="55000"/>
               <a:buFont typeface="Wingdings" charset="2"/>
               <a:buChar char=""/>
+              <a:tabLst>
+                <a:tab algn="l" pos="0"/>
+              </a:tabLst>
             </a:pPr>
             <a:r>
               <a:rPr b="0" lang="en-US" sz="2400" spc="-1" strike="noStrike">
@@ -8811,20 +8876,23 @@
             </a:endParaRPr>
           </a:p>
           <a:p>
-            <a:pPr marL="341280" indent="-332280">
+            <a:pPr marL="341280" indent="-331560">
               <a:lnSpc>
                 <a:spcPct val="100000"/>
               </a:lnSpc>
               <a:spcBef>
                 <a:spcPts val="598"/>
               </a:spcBef>
+              <a:tabLst>
+                <a:tab algn="l" pos="0"/>
+              </a:tabLst>
             </a:pPr>
             <a:endParaRPr b="0" lang="en-US" sz="2400" spc="-1" strike="noStrike">
               <a:latin typeface="Arial"/>
             </a:endParaRPr>
           </a:p>
           <a:p>
-            <a:pPr marL="333360" indent="-332280">
+            <a:pPr marL="333360" indent="-331560">
               <a:lnSpc>
                 <a:spcPct val="100000"/>
               </a:lnSpc>
@@ -8837,6 +8905,9 @@
               <a:buSzPct val="60000"/>
               <a:buFont typeface="Wingdings" charset="2"/>
               <a:buChar char=""/>
+              <a:tabLst>
+                <a:tab algn="l" pos="0"/>
+              </a:tabLst>
             </a:pPr>
             <a:r>
               <a:rPr b="0" lang="en-US" sz="2400" spc="-1" strike="noStrike">
@@ -8873,7 +8944,7 @@
             </a:endParaRPr>
           </a:p>
           <a:p>
-            <a:pPr lvl="1" marL="733320" indent="-275040">
+            <a:pPr lvl="1" marL="733320" indent="-274320">
               <a:lnSpc>
                 <a:spcPct val="100000"/>
               </a:lnSpc>
@@ -8886,6 +8957,9 @@
               <a:buSzPct val="55000"/>
               <a:buFont typeface="Wingdings" charset="2"/>
               <a:buChar char=""/>
+              <a:tabLst>
+                <a:tab algn="l" pos="0"/>
+              </a:tabLst>
             </a:pPr>
             <a:r>
               <a:rPr b="0" lang="en-US" sz="2400" spc="-1" strike="noStrike">
@@ -8905,33 +8979,14 @@
       </p:sp>
     </p:spTree>
   </p:cSld>
-  <p:timing>
-    <p:tnLst>
-      <p:par>
-        <p:cTn id="33" dur="indefinite" restart="never" nodeType="tmRoot">
-          <p:childTnLst>
-            <p:seq>
-              <p:cTn id="34" dur="indefinite" nodeType="mainSeq"/>
-              <p:prevCondLst>
-                <p:cond delay="0" evt="onPrev">
-                  <p:tgtEl>
-                    <p:sldTgt/>
-                  </p:tgtEl>
-                </p:cond>
-              </p:prevCondLst>
-              <p:nextCondLst>
-                <p:cond delay="0" evt="onNext">
-                  <p:tgtEl>
-                    <p:sldTgt/>
-                  </p:tgtEl>
-                </p:cond>
-              </p:nextCondLst>
-            </p:seq>
-          </p:childTnLst>
-        </p:cTn>
-      </p:par>
-    </p:tnLst>
-  </p:timing>
+  <mc:AlternateContent>
+    <mc:Choice Requires="p14">
+      <p:transition spd="slow" p14:dur="2000"/>
+    </mc:Choice>
+    <mc:Fallback>
+      <p:transition spd="slow"/>
+    </mc:Fallback>
+  </mc:AlternateContent>
 </p:sld>
 </file>
 
@@ -8968,7 +9023,7 @@
         <p:spPr>
           <a:xfrm>
             <a:off x="611280" y="259920"/>
-            <a:ext cx="7920360" cy="864000"/>
+            <a:ext cx="7919640" cy="863280"/>
           </a:xfrm>
           <a:prstGeom prst="rect">
             <a:avLst/>
@@ -8985,7 +9040,9 @@
           <a:fontRef idx="minor"/>
         </p:style>
         <p:txBody>
-          <a:bodyPr lIns="90000" rIns="90000" tIns="46800" bIns="46800" anchor="ctr"/>
+          <a:bodyPr lIns="90000" rIns="90000" tIns="46800" bIns="46800" anchor="ctr">
+            <a:noAutofit/>
+          </a:bodyPr>
           <a:p>
             <a:pPr algn="ctr">
               <a:lnSpc>
@@ -9017,7 +9074,7 @@
         <p:spPr>
           <a:xfrm>
             <a:off x="674280" y="1399680"/>
-            <a:ext cx="7920720" cy="5007600"/>
+            <a:ext cx="7920000" cy="5006880"/>
           </a:xfrm>
           <a:prstGeom prst="rect">
             <a:avLst/>
@@ -9038,7 +9095,7 @@
             <a:normAutofit/>
           </a:bodyPr>
           <a:p>
-            <a:pPr marL="333360" indent="-332280">
+            <a:pPr marL="333360" indent="-331560">
               <a:lnSpc>
                 <a:spcPct val="100000"/>
               </a:lnSpc>
@@ -9067,7 +9124,7 @@
             </a:endParaRPr>
           </a:p>
           <a:p>
-            <a:pPr marL="333360" indent="-332280">
+            <a:pPr marL="333360" indent="-331560">
               <a:lnSpc>
                 <a:spcPct val="100000"/>
               </a:lnSpc>
@@ -9099,33 +9156,14 @@
       </p:sp>
     </p:spTree>
   </p:cSld>
-  <p:timing>
-    <p:tnLst>
-      <p:par>
-        <p:cTn id="35" dur="indefinite" restart="never" nodeType="tmRoot">
-          <p:childTnLst>
-            <p:seq>
-              <p:cTn id="36" dur="indefinite" nodeType="mainSeq"/>
-              <p:prevCondLst>
-                <p:cond delay="0" evt="onPrev">
-                  <p:tgtEl>
-                    <p:sldTgt/>
-                  </p:tgtEl>
-                </p:cond>
-              </p:prevCondLst>
-              <p:nextCondLst>
-                <p:cond delay="0" evt="onNext">
-                  <p:tgtEl>
-                    <p:sldTgt/>
-                  </p:tgtEl>
-                </p:cond>
-              </p:nextCondLst>
-            </p:seq>
-          </p:childTnLst>
-        </p:cTn>
-      </p:par>
-    </p:tnLst>
-  </p:timing>
+  <mc:AlternateContent>
+    <mc:Choice Requires="p14">
+      <p:transition spd="slow" p14:dur="2000"/>
+    </mc:Choice>
+    <mc:Fallback>
+      <p:transition spd="slow"/>
+    </mc:Fallback>
+  </mc:AlternateContent>
 </p:sld>
 </file>
 
@@ -9162,7 +9200,7 @@
         <p:spPr>
           <a:xfrm>
             <a:off x="611280" y="259920"/>
-            <a:ext cx="7920360" cy="864000"/>
+            <a:ext cx="7919640" cy="863280"/>
           </a:xfrm>
           <a:prstGeom prst="rect">
             <a:avLst/>
@@ -9179,7 +9217,9 @@
           <a:fontRef idx="minor"/>
         </p:style>
         <p:txBody>
-          <a:bodyPr lIns="90000" rIns="90000" tIns="46800" bIns="46800" anchor="ctr"/>
+          <a:bodyPr lIns="90000" rIns="90000" tIns="46800" bIns="46800" anchor="ctr">
+            <a:noAutofit/>
+          </a:bodyPr>
           <a:p>
             <a:pPr algn="ctr">
               <a:lnSpc>
@@ -9211,7 +9251,7 @@
         <p:spPr>
           <a:xfrm>
             <a:off x="674280" y="1399680"/>
-            <a:ext cx="7920720" cy="4463280"/>
+            <a:ext cx="7920000" cy="4462560"/>
           </a:xfrm>
           <a:prstGeom prst="rect">
             <a:avLst/>
@@ -9337,7 +9377,18 @@
                 <a:latin typeface="Arial"/>
                 <a:ea typeface="DejaVu Sans"/>
               </a:rPr>
-              <a:t> - programming problems using recursion.  Recursion-1 set is easy, Recursion-2 is more challenging &amp; use backtracking. Only available for Java.</a:t>
+              <a:t> - programming problems using recursion.  Recursion-1 set is easy, Recursion-2 is more challenging &amp; use backtracking. </a:t>
+            </a:r>
+            <a:br/>
+            <a:r>
+              <a:rPr b="0" lang="en-US" sz="2400" spc="-1" strike="noStrike">
+                <a:solidFill>
+                  <a:srgbClr val="000000"/>
+                </a:solidFill>
+                <a:latin typeface="Arial"/>
+                <a:ea typeface="DejaVu Sans"/>
+              </a:rPr>
+              <a:t>Recursion problems only available for Java version.</a:t>
             </a:r>
             <a:endParaRPr b="0" lang="en-US" sz="2400" spc="-1" strike="noStrike">
               <a:latin typeface="Arial"/>
@@ -9403,33 +9454,14 @@
       </p:sp>
     </p:spTree>
   </p:cSld>
-  <p:timing>
-    <p:tnLst>
-      <p:par>
-        <p:cTn id="37" dur="indefinite" restart="never" nodeType="tmRoot">
-          <p:childTnLst>
-            <p:seq>
-              <p:cTn id="38" dur="indefinite" nodeType="mainSeq"/>
-              <p:prevCondLst>
-                <p:cond delay="0" evt="onPrev">
-                  <p:tgtEl>
-                    <p:sldTgt/>
-                  </p:tgtEl>
-                </p:cond>
-              </p:prevCondLst>
-              <p:nextCondLst>
-                <p:cond delay="0" evt="onNext">
-                  <p:tgtEl>
-                    <p:sldTgt/>
-                  </p:tgtEl>
-                </p:cond>
-              </p:nextCondLst>
-            </p:seq>
-          </p:childTnLst>
-        </p:cTn>
-      </p:par>
-    </p:tnLst>
-  </p:timing>
+  <mc:AlternateContent>
+    <mc:Choice Requires="p14">
+      <p:transition spd="slow" p14:dur="2000"/>
+    </mc:Choice>
+    <mc:Fallback>
+      <p:transition spd="slow"/>
+    </mc:Fallback>
+  </mc:AlternateContent>
 </p:sld>
 </file>
 
@@ -9466,7 +9498,7 @@
         <p:spPr>
           <a:xfrm>
             <a:off x="611280" y="259920"/>
-            <a:ext cx="7920360" cy="864000"/>
+            <a:ext cx="7919640" cy="863280"/>
           </a:xfrm>
           <a:prstGeom prst="rect">
             <a:avLst/>
@@ -9483,7 +9515,9 @@
           <a:fontRef idx="minor"/>
         </p:style>
         <p:txBody>
-          <a:bodyPr lIns="90000" rIns="90000" tIns="46800" bIns="46800" anchor="b"/>
+          <a:bodyPr lIns="90000" rIns="90000" tIns="46800" bIns="46800" anchor="b">
+            <a:noAutofit/>
+          </a:bodyPr>
           <a:p>
             <a:pPr algn="ctr">
               <a:lnSpc>
@@ -9515,7 +9549,7 @@
         <p:spPr>
           <a:xfrm>
             <a:off x="611280" y="1371600"/>
-            <a:ext cx="8441280" cy="5028120"/>
+            <a:ext cx="8440560" cy="5027400"/>
           </a:xfrm>
           <a:prstGeom prst="rect">
             <a:avLst/>
@@ -9885,33 +9919,14 @@
       </p:sp>
     </p:spTree>
   </p:cSld>
-  <p:timing>
-    <p:tnLst>
-      <p:par>
-        <p:cTn id="3" dur="indefinite" restart="never" nodeType="tmRoot">
-          <p:childTnLst>
-            <p:seq>
-              <p:cTn id="4" dur="indefinite" nodeType="mainSeq"/>
-              <p:prevCondLst>
-                <p:cond delay="0" evt="onPrev">
-                  <p:tgtEl>
-                    <p:sldTgt/>
-                  </p:tgtEl>
-                </p:cond>
-              </p:prevCondLst>
-              <p:nextCondLst>
-                <p:cond delay="0" evt="onNext">
-                  <p:tgtEl>
-                    <p:sldTgt/>
-                  </p:tgtEl>
-                </p:cond>
-              </p:nextCondLst>
-            </p:seq>
-          </p:childTnLst>
-        </p:cTn>
-      </p:par>
-    </p:tnLst>
-  </p:timing>
+  <mc:AlternateContent>
+    <mc:Choice Requires="p14">
+      <p:transition spd="slow" p14:dur="2000"/>
+    </mc:Choice>
+    <mc:Fallback>
+      <p:transition spd="slow"/>
+    </mc:Fallback>
+  </mc:AlternateContent>
 </p:sld>
 </file>
 
@@ -9948,7 +9963,7 @@
         <p:spPr>
           <a:xfrm>
             <a:off x="611280" y="259920"/>
-            <a:ext cx="7920360" cy="864000"/>
+            <a:ext cx="7919640" cy="863280"/>
           </a:xfrm>
           <a:prstGeom prst="rect">
             <a:avLst/>
@@ -9965,7 +9980,9 @@
           <a:fontRef idx="minor"/>
         </p:style>
         <p:txBody>
-          <a:bodyPr lIns="90000" rIns="90000" tIns="46800" bIns="46800" anchor="b"/>
+          <a:bodyPr lIns="90000" rIns="90000" tIns="46800" bIns="46800" anchor="b">
+            <a:noAutofit/>
+          </a:bodyPr>
           <a:p>
             <a:pPr algn="ctr">
               <a:lnSpc>
@@ -9997,7 +10014,7 @@
         <p:spPr>
           <a:xfrm>
             <a:off x="674280" y="1391760"/>
-            <a:ext cx="7920720" cy="1077120"/>
+            <a:ext cx="7920000" cy="1076400"/>
           </a:xfrm>
           <a:prstGeom prst="rect">
             <a:avLst/>
@@ -10051,7 +10068,7 @@
         <p:spPr>
           <a:xfrm>
             <a:off x="674640" y="2468520"/>
-            <a:ext cx="7679160" cy="1621800"/>
+            <a:ext cx="7678440" cy="1621080"/>
           </a:xfrm>
           <a:custGeom>
             <a:avLst/>
@@ -10094,7 +10111,9 @@
           <a:fontRef idx="minor"/>
         </p:style>
         <p:txBody>
-          <a:bodyPr lIns="90000" rIns="90000" tIns="46800" bIns="46800"/>
+          <a:bodyPr lIns="90000" rIns="90000" tIns="46800" bIns="46800">
+            <a:noAutofit/>
+          </a:bodyPr>
           <a:p>
             <a:pPr>
               <a:lnSpc>
@@ -10228,7 +10247,7 @@
         <p:spPr>
           <a:xfrm>
             <a:off x="582480" y="4754520"/>
-            <a:ext cx="7920720" cy="950040"/>
+            <a:ext cx="7920000" cy="949320"/>
           </a:xfrm>
           <a:prstGeom prst="rect">
             <a:avLst/>
@@ -10245,7 +10264,9 @@
           <a:fontRef idx="minor"/>
         </p:style>
         <p:txBody>
-          <a:bodyPr lIns="90000" rIns="90000" tIns="46800" bIns="46800"/>
+          <a:bodyPr lIns="90000" rIns="90000" tIns="46800" bIns="46800">
+            <a:noAutofit/>
+          </a:bodyPr>
           <a:p>
             <a:pPr>
               <a:lnSpc>
@@ -10284,33 +10305,14 @@
       </p:sp>
     </p:spTree>
   </p:cSld>
-  <p:timing>
-    <p:tnLst>
-      <p:par>
-        <p:cTn id="5" dur="indefinite" restart="never" nodeType="tmRoot">
-          <p:childTnLst>
-            <p:seq>
-              <p:cTn id="6" dur="indefinite" nodeType="mainSeq"/>
-              <p:prevCondLst>
-                <p:cond delay="0" evt="onPrev">
-                  <p:tgtEl>
-                    <p:sldTgt/>
-                  </p:tgtEl>
-                </p:cond>
-              </p:prevCondLst>
-              <p:nextCondLst>
-                <p:cond delay="0" evt="onNext">
-                  <p:tgtEl>
-                    <p:sldTgt/>
-                  </p:tgtEl>
-                </p:cond>
-              </p:nextCondLst>
-            </p:seq>
-          </p:childTnLst>
-        </p:cTn>
-      </p:par>
-    </p:tnLst>
-  </p:timing>
+  <mc:AlternateContent>
+    <mc:Choice Requires="p14">
+      <p:transition spd="slow" p14:dur="2000"/>
+    </mc:Choice>
+    <mc:Fallback>
+      <p:transition spd="slow"/>
+    </mc:Fallback>
+  </mc:AlternateContent>
 </p:sld>
 </file>
 
@@ -10347,7 +10349,7 @@
         <p:spPr>
           <a:xfrm>
             <a:off x="611280" y="259920"/>
-            <a:ext cx="7920360" cy="864000"/>
+            <a:ext cx="7919640" cy="863280"/>
           </a:xfrm>
           <a:prstGeom prst="rect">
             <a:avLst/>
@@ -10364,7 +10366,9 @@
           <a:fontRef idx="minor"/>
         </p:style>
         <p:txBody>
-          <a:bodyPr lIns="90000" rIns="90000" tIns="46800" bIns="46800" anchor="b"/>
+          <a:bodyPr lIns="90000" rIns="90000" tIns="46800" bIns="46800" anchor="b">
+            <a:noAutofit/>
+          </a:bodyPr>
           <a:p>
             <a:pPr algn="ctr">
               <a:lnSpc>
@@ -10396,7 +10400,7 @@
         <p:spPr>
           <a:xfrm>
             <a:off x="552600" y="1492200"/>
-            <a:ext cx="3530880" cy="336240"/>
+            <a:ext cx="3530160" cy="335520"/>
           </a:xfrm>
           <a:custGeom>
             <a:avLst/>
@@ -10439,7 +10443,9 @@
           <a:fontRef idx="minor"/>
         </p:style>
         <p:txBody>
-          <a:bodyPr lIns="90000" rIns="90000" tIns="46800" bIns="46800"/>
+          <a:bodyPr lIns="90000" rIns="90000" tIns="46800" bIns="46800">
+            <a:noAutofit/>
+          </a:bodyPr>
           <a:p>
             <a:pPr>
               <a:lnSpc>
@@ -10474,7 +10480,7 @@
         <p:spPr>
           <a:xfrm>
             <a:off x="1468440" y="2219400"/>
-            <a:ext cx="3531240" cy="873360"/>
+            <a:ext cx="3530520" cy="872640"/>
           </a:xfrm>
           <a:custGeom>
             <a:avLst/>
@@ -10517,7 +10523,9 @@
           <a:fontRef idx="minor"/>
         </p:style>
         <p:txBody>
-          <a:bodyPr lIns="90000" rIns="90000" tIns="46800" bIns="46800"/>
+          <a:bodyPr lIns="90000" rIns="90000" tIns="46800" bIns="46800">
+            <a:noAutofit/>
+          </a:bodyPr>
           <a:p>
             <a:pPr>
               <a:lnSpc>
@@ -10628,7 +10636,7 @@
         <p:spPr>
           <a:xfrm>
             <a:off x="2952720" y="3408480"/>
-            <a:ext cx="3531240" cy="873360"/>
+            <a:ext cx="3530520" cy="872640"/>
           </a:xfrm>
           <a:custGeom>
             <a:avLst/>
@@ -10671,7 +10679,9 @@
           <a:fontRef idx="minor"/>
         </p:style>
         <p:txBody>
-          <a:bodyPr lIns="90000" rIns="90000" tIns="46800" bIns="46800"/>
+          <a:bodyPr lIns="90000" rIns="90000" tIns="46800" bIns="46800">
+            <a:noAutofit/>
+          </a:bodyPr>
           <a:p>
             <a:pPr>
               <a:lnSpc>
@@ -10782,7 +10792,7 @@
         <p:spPr>
           <a:xfrm>
             <a:off x="4013280" y="4530600"/>
-            <a:ext cx="3530880" cy="873360"/>
+            <a:ext cx="3530160" cy="872640"/>
           </a:xfrm>
           <a:custGeom>
             <a:avLst/>
@@ -10825,7 +10835,9 @@
           <a:fontRef idx="minor"/>
         </p:style>
         <p:txBody>
-          <a:bodyPr lIns="90000" rIns="90000" tIns="46800" bIns="46800"/>
+          <a:bodyPr lIns="90000" rIns="90000" tIns="46800" bIns="46800">
+            <a:noAutofit/>
+          </a:bodyPr>
           <a:p>
             <a:pPr>
               <a:lnSpc>
@@ -10936,7 +10948,7 @@
         <p:spPr>
           <a:xfrm>
             <a:off x="4818240" y="5702400"/>
-            <a:ext cx="3530880" cy="873360"/>
+            <a:ext cx="3530160" cy="872640"/>
           </a:xfrm>
           <a:custGeom>
             <a:avLst/>
@@ -10979,7 +10991,9 @@
           <a:fontRef idx="minor"/>
         </p:style>
         <p:txBody>
-          <a:bodyPr lIns="90000" rIns="90000" tIns="46800" bIns="46800"/>
+          <a:bodyPr lIns="90000" rIns="90000" tIns="46800" bIns="46800">
+            <a:noAutofit/>
+          </a:bodyPr>
           <a:p>
             <a:pPr>
               <a:lnSpc>
@@ -11186,7 +11200,7 @@
         <p:spPr>
           <a:xfrm>
             <a:off x="1704960" y="1828800"/>
-            <a:ext cx="886320" cy="367200"/>
+            <a:ext cx="885600" cy="366480"/>
           </a:xfrm>
           <a:custGeom>
             <a:avLst/>
@@ -11226,7 +11240,9 @@
           <a:fontRef idx="minor"/>
         </p:style>
         <p:txBody>
-          <a:bodyPr lIns="90000" rIns="90000" tIns="46800" bIns="46800"/>
+          <a:bodyPr lIns="90000" rIns="90000" tIns="46800" bIns="46800">
+            <a:noAutofit/>
+          </a:bodyPr>
           <a:p>
             <a:pPr algn="r">
               <a:lnSpc>
@@ -11261,7 +11277,7 @@
         <p:spPr>
           <a:xfrm>
             <a:off x="2952720" y="3040200"/>
-            <a:ext cx="886320" cy="367200"/>
+            <a:ext cx="885600" cy="366480"/>
           </a:xfrm>
           <a:custGeom>
             <a:avLst/>
@@ -11301,7 +11317,9 @@
           <a:fontRef idx="minor"/>
         </p:style>
         <p:txBody>
-          <a:bodyPr lIns="90000" rIns="90000" tIns="46800" bIns="46800"/>
+          <a:bodyPr lIns="90000" rIns="90000" tIns="46800" bIns="46800">
+            <a:noAutofit/>
+          </a:bodyPr>
           <a:p>
             <a:pPr algn="r">
               <a:lnSpc>
@@ -11336,7 +11354,7 @@
         <p:spPr>
           <a:xfrm>
             <a:off x="4206960" y="4206960"/>
-            <a:ext cx="886320" cy="367200"/>
+            <a:ext cx="885600" cy="366480"/>
           </a:xfrm>
           <a:custGeom>
             <a:avLst/>
@@ -11376,7 +11394,9 @@
           <a:fontRef idx="minor"/>
         </p:style>
         <p:txBody>
-          <a:bodyPr lIns="90000" rIns="90000" tIns="46800" bIns="46800"/>
+          <a:bodyPr lIns="90000" rIns="90000" tIns="46800" bIns="46800">
+            <a:noAutofit/>
+          </a:bodyPr>
           <a:p>
             <a:pPr algn="r">
               <a:lnSpc>
@@ -11404,33 +11424,14 @@
       </p:sp>
     </p:spTree>
   </p:cSld>
-  <p:timing>
-    <p:tnLst>
-      <p:par>
-        <p:cTn id="7" dur="indefinite" restart="never" nodeType="tmRoot">
-          <p:childTnLst>
-            <p:seq>
-              <p:cTn id="8" dur="indefinite" nodeType="mainSeq"/>
-              <p:prevCondLst>
-                <p:cond delay="0" evt="onPrev">
-                  <p:tgtEl>
-                    <p:sldTgt/>
-                  </p:tgtEl>
-                </p:cond>
-              </p:prevCondLst>
-              <p:nextCondLst>
-                <p:cond delay="0" evt="onNext">
-                  <p:tgtEl>
-                    <p:sldTgt/>
-                  </p:tgtEl>
-                </p:cond>
-              </p:nextCondLst>
-            </p:seq>
-          </p:childTnLst>
-        </p:cTn>
-      </p:par>
-    </p:tnLst>
-  </p:timing>
+  <mc:AlternateContent>
+    <mc:Choice Requires="p14">
+      <p:transition spd="slow" p14:dur="2000"/>
+    </mc:Choice>
+    <mc:Fallback>
+      <p:transition spd="slow"/>
+    </mc:Fallback>
+  </mc:AlternateContent>
 </p:sld>
 </file>
 
@@ -11467,7 +11468,7 @@
         <p:spPr>
           <a:xfrm>
             <a:off x="611280" y="259920"/>
-            <a:ext cx="7920360" cy="864000"/>
+            <a:ext cx="7919640" cy="863280"/>
           </a:xfrm>
           <a:prstGeom prst="rect">
             <a:avLst/>
@@ -11484,7 +11485,9 @@
           <a:fontRef idx="minor"/>
         </p:style>
         <p:txBody>
-          <a:bodyPr lIns="90000" rIns="90000" tIns="46800" bIns="46800" anchor="b"/>
+          <a:bodyPr lIns="90000" rIns="90000" tIns="46800" bIns="46800" anchor="b">
+            <a:noAutofit/>
+          </a:bodyPr>
           <a:p>
             <a:pPr algn="ctr">
               <a:lnSpc>
@@ -11516,7 +11519,7 @@
         <p:spPr>
           <a:xfrm>
             <a:off x="552600" y="1492200"/>
-            <a:ext cx="3530880" cy="336240"/>
+            <a:ext cx="3530160" cy="335520"/>
           </a:xfrm>
           <a:custGeom>
             <a:avLst/>
@@ -11559,7 +11562,9 @@
           <a:fontRef idx="minor"/>
         </p:style>
         <p:txBody>
-          <a:bodyPr lIns="90000" rIns="90000" tIns="46800" bIns="46800"/>
+          <a:bodyPr lIns="90000" rIns="90000" tIns="46800" bIns="46800">
+            <a:noAutofit/>
+          </a:bodyPr>
           <a:p>
             <a:pPr>
               <a:lnSpc>
@@ -11594,7 +11599,7 @@
         <p:spPr>
           <a:xfrm>
             <a:off x="1468440" y="2219400"/>
-            <a:ext cx="3531240" cy="873360"/>
+            <a:ext cx="3530520" cy="872640"/>
           </a:xfrm>
           <a:custGeom>
             <a:avLst/>
@@ -11637,7 +11642,9 @@
           <a:fontRef idx="minor"/>
         </p:style>
         <p:txBody>
-          <a:bodyPr lIns="90000" rIns="90000" tIns="46800" bIns="46800"/>
+          <a:bodyPr lIns="90000" rIns="90000" tIns="46800" bIns="46800">
+            <a:noAutofit/>
+          </a:bodyPr>
           <a:p>
             <a:pPr>
               <a:lnSpc>
@@ -11728,7 +11735,7 @@
         <p:spPr>
           <a:xfrm>
             <a:off x="2952720" y="3408480"/>
-            <a:ext cx="3531240" cy="873360"/>
+            <a:ext cx="3530520" cy="872640"/>
           </a:xfrm>
           <a:custGeom>
             <a:avLst/>
@@ -11771,7 +11778,9 @@
           <a:fontRef idx="minor"/>
         </p:style>
         <p:txBody>
-          <a:bodyPr lIns="90000" rIns="90000" tIns="46800" bIns="46800"/>
+          <a:bodyPr lIns="90000" rIns="90000" tIns="46800" bIns="46800">
+            <a:noAutofit/>
+          </a:bodyPr>
           <a:p>
             <a:pPr>
               <a:lnSpc>
@@ -11862,7 +11871,7 @@
         <p:spPr>
           <a:xfrm>
             <a:off x="4013280" y="4530600"/>
-            <a:ext cx="3530880" cy="873360"/>
+            <a:ext cx="3530160" cy="872640"/>
           </a:xfrm>
           <a:custGeom>
             <a:avLst/>
@@ -11905,7 +11914,9 @@
           <a:fontRef idx="minor"/>
         </p:style>
         <p:txBody>
-          <a:bodyPr lIns="90000" rIns="90000" tIns="46800" bIns="46800"/>
+          <a:bodyPr lIns="90000" rIns="90000" tIns="46800" bIns="46800">
+            <a:noAutofit/>
+          </a:bodyPr>
           <a:p>
             <a:pPr>
               <a:lnSpc>
@@ -11996,7 +12007,7 @@
         <p:spPr>
           <a:xfrm>
             <a:off x="4818240" y="5702400"/>
-            <a:ext cx="3530880" cy="873360"/>
+            <a:ext cx="3530160" cy="872640"/>
           </a:xfrm>
           <a:custGeom>
             <a:avLst/>
@@ -12039,7 +12050,9 @@
           <a:fontRef idx="minor"/>
         </p:style>
         <p:txBody>
-          <a:bodyPr lIns="90000" rIns="90000" tIns="46800" bIns="46800"/>
+          <a:bodyPr lIns="90000" rIns="90000" tIns="46800" bIns="46800">
+            <a:noAutofit/>
+          </a:bodyPr>
           <a:p>
             <a:pPr>
               <a:lnSpc>
@@ -12275,7 +12288,7 @@
         <p:spPr>
           <a:xfrm>
             <a:off x="6897600" y="5402160"/>
-            <a:ext cx="2346840" cy="367200"/>
+            <a:ext cx="2346120" cy="366480"/>
           </a:xfrm>
           <a:custGeom>
             <a:avLst/>
@@ -12315,7 +12328,9 @@
           <a:fontRef idx="minor"/>
         </p:style>
         <p:txBody>
-          <a:bodyPr lIns="90000" rIns="90000" tIns="46800" bIns="46800"/>
+          <a:bodyPr lIns="90000" rIns="90000" tIns="46800" bIns="46800">
+            <a:noAutofit/>
+          </a:bodyPr>
           <a:p>
             <a:pPr>
               <a:lnSpc>
@@ -12379,7 +12394,7 @@
         <p:spPr>
           <a:xfrm>
             <a:off x="6037200" y="4237200"/>
-            <a:ext cx="1857960" cy="367200"/>
+            <a:ext cx="1857240" cy="366480"/>
           </a:xfrm>
           <a:custGeom>
             <a:avLst/>
@@ -12419,7 +12434,9 @@
           <a:fontRef idx="minor"/>
         </p:style>
         <p:txBody>
-          <a:bodyPr lIns="90000" rIns="90000" tIns="46800" bIns="46800"/>
+          <a:bodyPr lIns="90000" rIns="90000" tIns="46800" bIns="46800">
+            <a:noAutofit/>
+          </a:bodyPr>
           <a:p>
             <a:pPr>
               <a:lnSpc>
@@ -12483,7 +12500,7 @@
         <p:spPr>
           <a:xfrm>
             <a:off x="4788000" y="3063960"/>
-            <a:ext cx="1813320" cy="367200"/>
+            <a:ext cx="1812600" cy="366480"/>
           </a:xfrm>
           <a:custGeom>
             <a:avLst/>
@@ -12523,7 +12540,9 @@
           <a:fontRef idx="minor"/>
         </p:style>
         <p:txBody>
-          <a:bodyPr lIns="90000" rIns="90000" tIns="46800" bIns="46800"/>
+          <a:bodyPr lIns="90000" rIns="90000" tIns="46800" bIns="46800">
+            <a:noAutofit/>
+          </a:bodyPr>
           <a:p>
             <a:pPr>
               <a:lnSpc>
@@ -12587,7 +12606,7 @@
         <p:spPr>
           <a:xfrm>
             <a:off x="3362400" y="1866960"/>
-            <a:ext cx="1813320" cy="367200"/>
+            <a:ext cx="1812600" cy="366480"/>
           </a:xfrm>
           <a:custGeom>
             <a:avLst/>
@@ -12627,7 +12646,9 @@
           <a:fontRef idx="minor"/>
         </p:style>
         <p:txBody>
-          <a:bodyPr lIns="90000" rIns="90000" tIns="46800" bIns="46800"/>
+          <a:bodyPr lIns="90000" rIns="90000" tIns="46800" bIns="46800">
+            <a:noAutofit/>
+          </a:bodyPr>
           <a:p>
             <a:pPr>
               <a:lnSpc>
@@ -12662,7 +12683,7 @@
         <p:spPr>
           <a:xfrm>
             <a:off x="1704960" y="1828800"/>
-            <a:ext cx="886320" cy="367200"/>
+            <a:ext cx="885600" cy="366480"/>
           </a:xfrm>
           <a:custGeom>
             <a:avLst/>
@@ -12702,7 +12723,9 @@
           <a:fontRef idx="minor"/>
         </p:style>
         <p:txBody>
-          <a:bodyPr lIns="90000" rIns="90000" tIns="46800" bIns="46800"/>
+          <a:bodyPr lIns="90000" rIns="90000" tIns="46800" bIns="46800">
+            <a:noAutofit/>
+          </a:bodyPr>
           <a:p>
             <a:pPr algn="r">
               <a:lnSpc>
@@ -12737,7 +12760,7 @@
         <p:spPr>
           <a:xfrm>
             <a:off x="2948040" y="3046320"/>
-            <a:ext cx="886320" cy="367200"/>
+            <a:ext cx="885600" cy="366480"/>
           </a:xfrm>
           <a:custGeom>
             <a:avLst/>
@@ -12777,7 +12800,9 @@
           <a:fontRef idx="minor"/>
         </p:style>
         <p:txBody>
-          <a:bodyPr lIns="90000" rIns="90000" tIns="46800" bIns="46800"/>
+          <a:bodyPr lIns="90000" rIns="90000" tIns="46800" bIns="46800">
+            <a:noAutofit/>
+          </a:bodyPr>
           <a:p>
             <a:pPr algn="r">
               <a:lnSpc>
@@ -12812,7 +12837,7 @@
         <p:spPr>
           <a:xfrm>
             <a:off x="3292560" y="1492200"/>
-            <a:ext cx="1813320" cy="367200"/>
+            <a:ext cx="1812600" cy="366480"/>
           </a:xfrm>
           <a:custGeom>
             <a:avLst/>
@@ -12852,7 +12877,9 @@
           <a:fontRef idx="minor"/>
         </p:style>
         <p:txBody>
-          <a:bodyPr lIns="90000" rIns="90000" tIns="46800" bIns="46800"/>
+          <a:bodyPr lIns="90000" rIns="90000" tIns="46800" bIns="46800">
+            <a:noAutofit/>
+          </a:bodyPr>
           <a:p>
             <a:pPr>
               <a:lnSpc>
@@ -12890,33 +12917,14 @@
       </p:sp>
     </p:spTree>
   </p:cSld>
-  <p:timing>
-    <p:tnLst>
-      <p:par>
-        <p:cTn id="9" dur="indefinite" restart="never" nodeType="tmRoot">
-          <p:childTnLst>
-            <p:seq>
-              <p:cTn id="10" dur="indefinite" nodeType="mainSeq"/>
-              <p:prevCondLst>
-                <p:cond delay="0" evt="onPrev">
-                  <p:tgtEl>
-                    <p:sldTgt/>
-                  </p:tgtEl>
-                </p:cond>
-              </p:prevCondLst>
-              <p:nextCondLst>
-                <p:cond delay="0" evt="onNext">
-                  <p:tgtEl>
-                    <p:sldTgt/>
-                  </p:tgtEl>
-                </p:cond>
-              </p:nextCondLst>
-            </p:seq>
-          </p:childTnLst>
-        </p:cTn>
-      </p:par>
-    </p:tnLst>
-  </p:timing>
+  <mc:AlternateContent>
+    <mc:Choice Requires="p14">
+      <p:transition spd="slow" p14:dur="2000"/>
+    </mc:Choice>
+    <mc:Fallback>
+      <p:transition spd="slow"/>
+    </mc:Fallback>
+  </mc:AlternateContent>
 </p:sld>
 </file>
 
@@ -12953,7 +12961,7 @@
         <p:spPr>
           <a:xfrm>
             <a:off x="611280" y="259920"/>
-            <a:ext cx="7920360" cy="864000"/>
+            <a:ext cx="7919640" cy="863280"/>
           </a:xfrm>
           <a:prstGeom prst="rect">
             <a:avLst/>
@@ -12970,7 +12978,9 @@
           <a:fontRef idx="minor"/>
         </p:style>
         <p:txBody>
-          <a:bodyPr lIns="90000" rIns="90000" tIns="46800" bIns="46800" anchor="b"/>
+          <a:bodyPr lIns="90000" rIns="90000" tIns="46800" bIns="46800" anchor="b">
+            <a:noAutofit/>
+          </a:bodyPr>
           <a:p>
             <a:pPr algn="ctr">
               <a:lnSpc>
@@ -13002,7 +13012,7 @@
         <p:spPr>
           <a:xfrm>
             <a:off x="674280" y="1391760"/>
-            <a:ext cx="7920720" cy="1208880"/>
+            <a:ext cx="7920000" cy="1208160"/>
           </a:xfrm>
           <a:prstGeom prst="rect">
             <a:avLst/>
@@ -13159,7 +13169,7 @@
         <p:spPr>
           <a:xfrm>
             <a:off x="558720" y="2771640"/>
-            <a:ext cx="5018760" cy="1407600"/>
+            <a:ext cx="5018040" cy="1406880"/>
           </a:xfrm>
           <a:custGeom>
             <a:avLst/>
@@ -13202,7 +13212,9 @@
           <a:fontRef idx="minor"/>
         </p:style>
         <p:txBody>
-          <a:bodyPr lIns="90000" rIns="90000" tIns="46800" bIns="46800"/>
+          <a:bodyPr lIns="90000" rIns="90000" tIns="46800" bIns="46800">
+            <a:noAutofit/>
+          </a:bodyPr>
           <a:p>
             <a:pPr>
               <a:lnSpc>
@@ -13332,7 +13344,7 @@
         <p:spPr>
           <a:xfrm>
             <a:off x="6073920" y="2795760"/>
-            <a:ext cx="2298960" cy="1464480"/>
+            <a:ext cx="2298240" cy="1463760"/>
           </a:xfrm>
           <a:custGeom>
             <a:avLst/>
@@ -13372,7 +13384,9 @@
           <a:fontRef idx="minor"/>
         </p:style>
         <p:txBody>
-          <a:bodyPr lIns="90000" rIns="90000" tIns="46800" bIns="46800"/>
+          <a:bodyPr lIns="90000" rIns="90000" tIns="46800" bIns="46800">
+            <a:noAutofit/>
+          </a:bodyPr>
           <a:p>
             <a:pPr>
               <a:lnSpc>
@@ -13427,7 +13441,7 @@
         <p:spPr>
           <a:xfrm>
             <a:off x="558720" y="4857840"/>
-            <a:ext cx="5018760" cy="1407600"/>
+            <a:ext cx="5018040" cy="1406880"/>
           </a:xfrm>
           <a:custGeom>
             <a:avLst/>
@@ -13470,7 +13484,9 @@
           <a:fontRef idx="minor"/>
         </p:style>
         <p:txBody>
-          <a:bodyPr lIns="90000" rIns="90000" tIns="46800" bIns="46800"/>
+          <a:bodyPr lIns="90000" rIns="90000" tIns="46800" bIns="46800">
+            <a:noAutofit/>
+          </a:bodyPr>
           <a:p>
             <a:pPr>
               <a:lnSpc>
@@ -13620,7 +13636,7 @@
         <p:spPr>
           <a:xfrm>
             <a:off x="6073920" y="4881600"/>
-            <a:ext cx="2429280" cy="641520"/>
+            <a:ext cx="2428560" cy="640800"/>
           </a:xfrm>
           <a:custGeom>
             <a:avLst/>
@@ -13660,7 +13676,9 @@
           <a:fontRef idx="minor"/>
         </p:style>
         <p:txBody>
-          <a:bodyPr lIns="90000" rIns="90000" tIns="46800" bIns="46800"/>
+          <a:bodyPr lIns="90000" rIns="90000" tIns="46800" bIns="46800">
+            <a:noAutofit/>
+          </a:bodyPr>
           <a:p>
             <a:pPr>
               <a:lnSpc>
@@ -13708,7 +13726,7 @@
         <p:spPr>
           <a:xfrm>
             <a:off x="558720" y="4368960"/>
-            <a:ext cx="2299320" cy="458640"/>
+            <a:ext cx="2298600" cy="457920"/>
           </a:xfrm>
           <a:custGeom>
             <a:avLst/>
@@ -13748,7 +13766,9 @@
           <a:fontRef idx="minor"/>
         </p:style>
         <p:txBody>
-          <a:bodyPr lIns="90000" rIns="90000" tIns="46800" bIns="46800"/>
+          <a:bodyPr lIns="90000" rIns="90000" tIns="46800" bIns="46800">
+            <a:noAutofit/>
+          </a:bodyPr>
           <a:p>
             <a:pPr>
               <a:lnSpc>
@@ -13786,33 +13806,14 @@
       </p:sp>
     </p:spTree>
   </p:cSld>
-  <p:timing>
-    <p:tnLst>
-      <p:par>
-        <p:cTn id="11" dur="indefinite" restart="never" nodeType="tmRoot">
-          <p:childTnLst>
-            <p:seq>
-              <p:cTn id="12" dur="indefinite" nodeType="mainSeq"/>
-              <p:prevCondLst>
-                <p:cond delay="0" evt="onPrev">
-                  <p:tgtEl>
-                    <p:sldTgt/>
-                  </p:tgtEl>
-                </p:cond>
-              </p:prevCondLst>
-              <p:nextCondLst>
-                <p:cond delay="0" evt="onNext">
-                  <p:tgtEl>
-                    <p:sldTgt/>
-                  </p:tgtEl>
-                </p:cond>
-              </p:nextCondLst>
-            </p:seq>
-          </p:childTnLst>
-        </p:cTn>
-      </p:par>
-    </p:tnLst>
-  </p:timing>
+  <mc:AlternateContent>
+    <mc:Choice Requires="p14">
+      <p:transition spd="slow" p14:dur="2000"/>
+    </mc:Choice>
+    <mc:Fallback>
+      <p:transition spd="slow"/>
+    </mc:Fallback>
+  </mc:AlternateContent>
 </p:sld>
 </file>
 
@@ -13849,7 +13850,7 @@
         <p:spPr>
           <a:xfrm>
             <a:off x="611280" y="259920"/>
-            <a:ext cx="7920360" cy="864000"/>
+            <a:ext cx="7919640" cy="863280"/>
           </a:xfrm>
           <a:prstGeom prst="rect">
             <a:avLst/>
@@ -13866,7 +13867,9 @@
           <a:fontRef idx="minor"/>
         </p:style>
         <p:txBody>
-          <a:bodyPr lIns="90000" rIns="90000" tIns="46800" bIns="46800" anchor="b"/>
+          <a:bodyPr lIns="90000" rIns="90000" tIns="46800" bIns="46800" anchor="b">
+            <a:noAutofit/>
+          </a:bodyPr>
           <a:p>
             <a:pPr algn="ctr">
               <a:lnSpc>
@@ -13898,7 +13901,7 @@
         <p:spPr>
           <a:xfrm>
             <a:off x="674280" y="1463760"/>
-            <a:ext cx="7920720" cy="2284920"/>
+            <a:ext cx="7920000" cy="2284200"/>
           </a:xfrm>
           <a:prstGeom prst="rect">
             <a:avLst/>
@@ -14124,33 +14127,14 @@
       </p:sp>
     </p:spTree>
   </p:cSld>
-  <p:timing>
-    <p:tnLst>
-      <p:par>
-        <p:cTn id="13" dur="indefinite" restart="never" nodeType="tmRoot">
-          <p:childTnLst>
-            <p:seq>
-              <p:cTn id="14" dur="indefinite" nodeType="mainSeq"/>
-              <p:prevCondLst>
-                <p:cond delay="0" evt="onPrev">
-                  <p:tgtEl>
-                    <p:sldTgt/>
-                  </p:tgtEl>
-                </p:cond>
-              </p:prevCondLst>
-              <p:nextCondLst>
-                <p:cond delay="0" evt="onNext">
-                  <p:tgtEl>
-                    <p:sldTgt/>
-                  </p:tgtEl>
-                </p:cond>
-              </p:nextCondLst>
-            </p:seq>
-          </p:childTnLst>
-        </p:cTn>
-      </p:par>
-    </p:tnLst>
-  </p:timing>
+  <mc:AlternateContent>
+    <mc:Choice Requires="p14">
+      <p:transition spd="slow" p14:dur="2000"/>
+    </mc:Choice>
+    <mc:Fallback>
+      <p:transition spd="slow"/>
+    </mc:Fallback>
+  </mc:AlternateContent>
 </p:sld>
 </file>
 
@@ -14187,7 +14171,7 @@
         <p:spPr>
           <a:xfrm>
             <a:off x="611280" y="259920"/>
-            <a:ext cx="7920360" cy="864000"/>
+            <a:ext cx="7919640" cy="863280"/>
           </a:xfrm>
           <a:prstGeom prst="rect">
             <a:avLst/>
@@ -14204,7 +14188,9 @@
           <a:fontRef idx="minor"/>
         </p:style>
         <p:txBody>
-          <a:bodyPr lIns="90000" rIns="90000" tIns="46800" bIns="46800" anchor="ctr"/>
+          <a:bodyPr lIns="90000" rIns="90000" tIns="46800" bIns="46800" anchor="ctr">
+            <a:noAutofit/>
+          </a:bodyPr>
           <a:p>
             <a:pPr algn="ctr">
               <a:lnSpc>
@@ -14236,7 +14222,7 @@
         <p:spPr>
           <a:xfrm>
             <a:off x="674280" y="1400040"/>
-            <a:ext cx="7920720" cy="2988360"/>
+            <a:ext cx="7920000" cy="2987640"/>
           </a:xfrm>
           <a:prstGeom prst="rect">
             <a:avLst/>
@@ -14342,33 +14328,14 @@
       </p:sp>
     </p:spTree>
   </p:cSld>
-  <p:timing>
-    <p:tnLst>
-      <p:par>
-        <p:cTn id="15" dur="indefinite" restart="never" nodeType="tmRoot">
-          <p:childTnLst>
-            <p:seq>
-              <p:cTn id="16" dur="indefinite" nodeType="mainSeq"/>
-              <p:prevCondLst>
-                <p:cond delay="0" evt="onPrev">
-                  <p:tgtEl>
-                    <p:sldTgt/>
-                  </p:tgtEl>
-                </p:cond>
-              </p:prevCondLst>
-              <p:nextCondLst>
-                <p:cond delay="0" evt="onNext">
-                  <p:tgtEl>
-                    <p:sldTgt/>
-                  </p:tgtEl>
-                </p:cond>
-              </p:nextCondLst>
-            </p:seq>
-          </p:childTnLst>
-        </p:cTn>
-      </p:par>
-    </p:tnLst>
-  </p:timing>
+  <mc:AlternateContent>
+    <mc:Choice Requires="p14">
+      <p:transition spd="slow" p14:dur="2000"/>
+    </mc:Choice>
+    <mc:Fallback>
+      <p:transition spd="slow"/>
+    </mc:Fallback>
+  </mc:AlternateContent>
 </p:sld>
 </file>
 
@@ -14405,7 +14372,7 @@
         <p:spPr>
           <a:xfrm>
             <a:off x="611280" y="259920"/>
-            <a:ext cx="7920360" cy="864000"/>
+            <a:ext cx="7919640" cy="863280"/>
           </a:xfrm>
           <a:prstGeom prst="rect">
             <a:avLst/>
@@ -14422,7 +14389,9 @@
           <a:fontRef idx="minor"/>
         </p:style>
         <p:txBody>
-          <a:bodyPr lIns="90000" rIns="90000" tIns="46800" bIns="46800" anchor="ctr"/>
+          <a:bodyPr lIns="90000" rIns="90000" tIns="46800" bIns="46800" anchor="ctr">
+            <a:noAutofit/>
+          </a:bodyPr>
           <a:p>
             <a:pPr algn="ctr">
               <a:lnSpc>
@@ -14454,7 +14423,7 @@
         <p:spPr>
           <a:xfrm>
             <a:off x="674280" y="1400040"/>
-            <a:ext cx="7920720" cy="702360"/>
+            <a:ext cx="7920000" cy="701640"/>
           </a:xfrm>
           <a:prstGeom prst="rect">
             <a:avLst/>
@@ -14521,7 +14490,7 @@
         <p:spPr>
           <a:xfrm>
             <a:off x="639720" y="2011320"/>
-            <a:ext cx="7679160" cy="3971520"/>
+            <a:ext cx="7678440" cy="3970800"/>
           </a:xfrm>
           <a:custGeom>
             <a:avLst/>
@@ -14564,7 +14533,9 @@
           <a:fontRef idx="minor"/>
         </p:style>
         <p:txBody>
-          <a:bodyPr lIns="90000" rIns="90000" tIns="46800" bIns="46800"/>
+          <a:bodyPr lIns="90000" rIns="90000" tIns="46800" bIns="46800">
+            <a:noAutofit/>
+          </a:bodyPr>
           <a:p>
             <a:pPr>
               <a:lnSpc>
@@ -14803,33 +14774,14 @@
       </p:sp>
     </p:spTree>
   </p:cSld>
-  <p:timing>
-    <p:tnLst>
-      <p:par>
-        <p:cTn id="17" dur="indefinite" restart="never" nodeType="tmRoot">
-          <p:childTnLst>
-            <p:seq>
-              <p:cTn id="18" dur="indefinite" nodeType="mainSeq"/>
-              <p:prevCondLst>
-                <p:cond delay="0" evt="onPrev">
-                  <p:tgtEl>
-                    <p:sldTgt/>
-                  </p:tgtEl>
-                </p:cond>
-              </p:prevCondLst>
-              <p:nextCondLst>
-                <p:cond delay="0" evt="onNext">
-                  <p:tgtEl>
-                    <p:sldTgt/>
-                  </p:tgtEl>
-                </p:cond>
-              </p:nextCondLst>
-            </p:seq>
-          </p:childTnLst>
-        </p:cTn>
-      </p:par>
-    </p:tnLst>
-  </p:timing>
+  <mc:AlternateContent>
+    <mc:Choice Requires="p14">
+      <p:transition spd="slow" p14:dur="2000"/>
+    </mc:Choice>
+    <mc:Fallback>
+      <p:transition spd="slow"/>
+    </mc:Fallback>
+  </mc:AlternateContent>
 </p:sld>
 </file>
 
@@ -14947,18 +14899,21 @@
             </a:schemeClr>
           </a:solidFill>
           <a:prstDash val="solid"/>
+          <a:miter/>
         </a:ln>
         <a:ln w="25400" cap="flat" cmpd="sng" algn="ctr">
           <a:solidFill>
             <a:schemeClr val="phClr"/>
           </a:solidFill>
           <a:prstDash val="solid"/>
+          <a:miter/>
         </a:ln>
         <a:ln w="38100" cap="flat" cmpd="sng" algn="ctr">
           <a:solidFill>
             <a:schemeClr val="phClr"/>
           </a:solidFill>
           <a:prstDash val="solid"/>
+          <a:miter/>
         </a:ln>
       </a:lnStyleLst>
       <a:effectStyleLst>
@@ -15170,18 +15125,21 @@
             </a:schemeClr>
           </a:solidFill>
           <a:prstDash val="solid"/>
+          <a:miter/>
         </a:ln>
         <a:ln w="25400" cap="flat" cmpd="sng" algn="ctr">
           <a:solidFill>
             <a:schemeClr val="phClr"/>
           </a:solidFill>
           <a:prstDash val="solid"/>
+          <a:miter/>
         </a:ln>
         <a:ln w="38100" cap="flat" cmpd="sng" algn="ctr">
           <a:solidFill>
             <a:schemeClr val="phClr"/>
           </a:solidFill>
           <a:prstDash val="solid"/>
+          <a:miter/>
         </a:ln>
       </a:lnStyleLst>
       <a:effectStyleLst>
@@ -15393,18 +15351,21 @@
             </a:schemeClr>
           </a:solidFill>
           <a:prstDash val="solid"/>
+          <a:miter/>
         </a:ln>
         <a:ln w="25400" cap="flat" cmpd="sng" algn="ctr">
           <a:solidFill>
             <a:schemeClr val="phClr"/>
           </a:solidFill>
           <a:prstDash val="solid"/>
+          <a:miter/>
         </a:ln>
         <a:ln w="38100" cap="flat" cmpd="sng" algn="ctr">
           <a:solidFill>
             <a:schemeClr val="phClr"/>
           </a:solidFill>
           <a:prstDash val="solid"/>
+          <a:miter/>
         </a:ln>
       </a:lnStyleLst>
       <a:effectStyleLst>

</xml_diff>